<commit_message>
Slide pack where statistics figure was updated to use transparent rectangles
</commit_message>
<xml_diff>
--- a/pres/Backup and References - RGroup Stat stuff not presented at ACS.pptx
+++ b/pres/Backup and References - RGroup Stat stuff not presented at ACS.pptx
@@ -6,12 +6,13 @@
     <p:sldMasterId id="2147483660" r:id="rId2"/>
   </p:sldMasterIdLst>
   <p:notesMasterIdLst>
-    <p:notesMasterId r:id="rId6"/>
+    <p:notesMasterId r:id="rId7"/>
   </p:notesMasterIdLst>
   <p:sldIdLst>
     <p:sldId id="256" r:id="rId3"/>
     <p:sldId id="257" r:id="rId4"/>
     <p:sldId id="258" r:id="rId5"/>
+    <p:sldId id="259" r:id="rId6"/>
   </p:sldIdLst>
   <p:sldSz cx="9144000" cy="6858000" type="screen4x3"/>
   <p:notesSz cx="6858000" cy="9144000"/>
@@ -110,6 +111,22 @@
       </a:defRPr>
     </a:lvl9pPr>
   </p:defaultTextStyle>
+  <p:extLst>
+    <p:ext uri="{EFAFB233-063F-42B5-8137-9DF3F51BA10A}">
+      <p15:sldGuideLst xmlns:p15="http://schemas.microsoft.com/office/powerpoint/2012/main">
+        <p15:guide id="1" orient="horz" pos="2160">
+          <p15:clr>
+            <a:srgbClr val="A4A3A4"/>
+          </p15:clr>
+        </p15:guide>
+        <p15:guide id="2" pos="2880">
+          <p15:clr>
+            <a:srgbClr val="A4A3A4"/>
+          </p15:clr>
+        </p15:guide>
+      </p15:sldGuideLst>
+    </p:ext>
+  </p:extLst>
 </p:presentation>
 </file>
 
@@ -195,7 +212,7 @@
           <a:p>
             <a:fld id="{F2B6F123-D858-419C-99DB-3D817C725552}" type="datetimeFigureOut">
               <a:rPr lang="en-US" smtClean="0"/>
-              <a:t>10/1/2016</a:t>
+              <a:t>8/4/2018</a:t>
             </a:fld>
             <a:endParaRPr lang="en-US"/>
           </a:p>
@@ -261,38 +278,37 @@
           <a:p>
             <a:pPr lvl="0"/>
             <a:r>
-              <a:rPr lang="en-US" smtClean="0"/>
+              <a:rPr lang="en-US"/>
               <a:t>Click to edit Master text styles</a:t>
             </a:r>
           </a:p>
           <a:p>
             <a:pPr lvl="1"/>
             <a:r>
-              <a:rPr lang="en-US" smtClean="0"/>
+              <a:rPr lang="en-US"/>
               <a:t>Second level</a:t>
             </a:r>
           </a:p>
           <a:p>
             <a:pPr lvl="2"/>
             <a:r>
-              <a:rPr lang="en-US" smtClean="0"/>
+              <a:rPr lang="en-US"/>
               <a:t>Third level</a:t>
             </a:r>
           </a:p>
           <a:p>
             <a:pPr lvl="3"/>
             <a:r>
-              <a:rPr lang="en-US" smtClean="0"/>
+              <a:rPr lang="en-US"/>
               <a:t>Fourth level</a:t>
             </a:r>
           </a:p>
           <a:p>
             <a:pPr lvl="4"/>
             <a:r>
-              <a:rPr lang="en-US" smtClean="0"/>
+              <a:rPr lang="en-US"/>
               <a:t>Fifth level</a:t>
             </a:r>
-            <a:endParaRPr lang="en-US"/>
           </a:p>
         </p:txBody>
       </p:sp>
@@ -507,14 +523,14 @@
           <a:lstStyle/>
           <a:p>
             <a:r>
-              <a:rPr lang="en-US" dirty="0" smtClean="0"/>
+              <a:rPr lang="en-US" dirty="0"/>
               <a:t>Stats:</a:t>
             </a:r>
           </a:p>
           <a:p>
             <a:pPr lvl="0"/>
             <a:r>
-              <a:rPr lang="en-US" sz="1200" kern="1200" dirty="0" smtClean="0">
+              <a:rPr lang="en-US" sz="1200" kern="1200" dirty="0">
                 <a:solidFill>
                   <a:schemeClr val="tx1"/>
                 </a:solidFill>
@@ -528,7 +544,7 @@
           <a:p>
             <a:pPr lvl="0"/>
             <a:r>
-              <a:rPr lang="en-US" sz="1200" kern="1200" dirty="0" smtClean="0">
+              <a:rPr lang="en-US" sz="1200" kern="1200" dirty="0">
                 <a:solidFill>
                   <a:schemeClr val="tx1"/>
                 </a:solidFill>
@@ -539,7 +555,7 @@
               <a:t>On the aggregate (average/median), you can link to about twice as many molecules with the frameworks, however, this is because on the aggregate there are 6 times more frameworks than NCATS scaffolds, so the “fragment efficiency” is actually 3 times greater for NCATS scaffolds. One could also argue that many of the framework-only links (</a:t>
             </a:r>
             <a:r>
-              <a:rPr lang="en-US" sz="1200" kern="1200" dirty="0" err="1" smtClean="0">
+              <a:rPr lang="en-US" sz="1200" kern="1200" dirty="0" err="1">
                 <a:solidFill>
                   <a:schemeClr val="tx1"/>
                 </a:solidFill>
@@ -550,7 +566,7 @@
               <a:t>eg</a:t>
             </a:r>
             <a:r>
-              <a:rPr lang="en-US" sz="1200" kern="1200" dirty="0" smtClean="0">
+              <a:rPr lang="en-US" sz="1200" kern="1200" dirty="0">
                 <a:solidFill>
                   <a:schemeClr val="tx1"/>
                 </a:solidFill>
@@ -564,7 +580,7 @@
           <a:p>
             <a:pPr lvl="0"/>
             <a:r>
-              <a:rPr lang="en-US" sz="1200" kern="1200" dirty="0" smtClean="0">
+              <a:rPr lang="en-US" sz="1200" kern="1200" dirty="0">
                 <a:solidFill>
                   <a:schemeClr val="tx1"/>
                 </a:solidFill>
@@ -575,7 +591,7 @@
               <a:t>The outliers are interesting: compounds in a rare </a:t>
             </a:r>
             <a:r>
-              <a:rPr lang="en-US" sz="1200" kern="1200" dirty="0" err="1" smtClean="0">
+              <a:rPr lang="en-US" sz="1200" kern="1200" dirty="0" err="1">
                 <a:solidFill>
                   <a:schemeClr val="tx1"/>
                 </a:solidFill>
@@ -586,7 +602,7 @@
               <a:t>tautomer</a:t>
             </a:r>
             <a:r>
-              <a:rPr lang="en-US" sz="1200" kern="1200" dirty="0" smtClean="0">
+              <a:rPr lang="en-US" sz="1200" kern="1200" dirty="0">
                 <a:solidFill>
                   <a:schemeClr val="tx1"/>
                 </a:solidFill>
@@ -597,7 +613,7 @@
               <a:t> are unified with the dominant one by the NCATS tool, but left as singletons by the frameworks. And compounds whose only link with other molecules would be </a:t>
             </a:r>
             <a:r>
-              <a:rPr lang="en-US" sz="1200" kern="1200" dirty="0" err="1" smtClean="0">
+              <a:rPr lang="en-US" sz="1200" kern="1200" dirty="0" err="1">
                 <a:solidFill>
                   <a:schemeClr val="tx1"/>
                 </a:solidFill>
@@ -608,7 +624,7 @@
               <a:t>eg</a:t>
             </a:r>
             <a:r>
-              <a:rPr lang="en-US" sz="1200" kern="1200" dirty="0" smtClean="0">
+              <a:rPr lang="en-US" sz="1200" kern="1200" dirty="0">
                 <a:solidFill>
                   <a:schemeClr val="tx1"/>
                 </a:solidFill>
@@ -657,6 +673,215 @@
         </p:txBody>
       </p:sp>
     </p:spTree>
+  </p:cSld>
+  <p:clrMapOvr>
+    <a:masterClrMapping/>
+  </p:clrMapOvr>
+</p:notes>
+</file>
+
+<file path=ppt/notesSlides/notesSlide2.xml><?xml version="1.0" encoding="utf-8"?>
+<p:notes xmlns:a="http://schemas.openxmlformats.org/drawingml/2006/main" xmlns:r="http://schemas.openxmlformats.org/officeDocument/2006/relationships" xmlns:p="http://schemas.openxmlformats.org/presentationml/2006/main">
+  <p:cSld>
+    <p:spTree>
+      <p:nvGrpSpPr>
+        <p:cNvPr id="1" name=""/>
+        <p:cNvGrpSpPr/>
+        <p:nvPr/>
+      </p:nvGrpSpPr>
+      <p:grpSpPr>
+        <a:xfrm>
+          <a:off x="0" y="0"/>
+          <a:ext cx="0" cy="0"/>
+          <a:chOff x="0" y="0"/>
+          <a:chExt cx="0" cy="0"/>
+        </a:xfrm>
+      </p:grpSpPr>
+      <p:sp>
+        <p:nvSpPr>
+          <p:cNvPr id="2" name="Slide Image Placeholder 1"/>
+          <p:cNvSpPr>
+            <a:spLocks noGrp="1" noRot="1" noChangeAspect="1"/>
+          </p:cNvSpPr>
+          <p:nvPr>
+            <p:ph type="sldImg"/>
+          </p:nvPr>
+        </p:nvSpPr>
+        <p:spPr/>
+      </p:sp>
+      <p:sp>
+        <p:nvSpPr>
+          <p:cNvPr id="3" name="Notes Placeholder 2"/>
+          <p:cNvSpPr>
+            <a:spLocks noGrp="1"/>
+          </p:cNvSpPr>
+          <p:nvPr>
+            <p:ph type="body" idx="1"/>
+          </p:nvPr>
+        </p:nvSpPr>
+        <p:spPr/>
+        <p:txBody>
+          <a:bodyPr>
+            <a:normAutofit/>
+          </a:bodyPr>
+          <a:lstStyle/>
+          <a:p>
+            <a:r>
+              <a:rPr lang="en-US" dirty="0"/>
+              <a:t>Stats:</a:t>
+            </a:r>
+          </a:p>
+          <a:p>
+            <a:pPr lvl="0"/>
+            <a:r>
+              <a:rPr lang="en-US" sz="1200" kern="1200" dirty="0">
+                <a:solidFill>
+                  <a:schemeClr val="tx1"/>
+                </a:solidFill>
+                <a:latin typeface="+mn-lt"/>
+                <a:ea typeface="+mn-ea"/>
+                <a:cs typeface="+mn-cs"/>
+              </a:rPr>
+              <a:t>The two methods allow you to access different sets of molecules starting from any molecule in TCAMS (average overlap in coverage is 40%).</a:t>
+            </a:r>
+          </a:p>
+          <a:p>
+            <a:pPr lvl="0"/>
+            <a:r>
+              <a:rPr lang="en-US" sz="1200" kern="1200" dirty="0">
+                <a:solidFill>
+                  <a:schemeClr val="tx1"/>
+                </a:solidFill>
+                <a:latin typeface="+mn-lt"/>
+                <a:ea typeface="+mn-ea"/>
+                <a:cs typeface="+mn-cs"/>
+              </a:rPr>
+              <a:t>On the aggregate (average/median), you can link to about twice as many molecules with the frameworks, however, this is because on the aggregate there are 6 times more frameworks than NCATS scaffolds, so the “fragment efficiency” is actually 3 times greater for NCATS scaffolds. One could also argue that many of the framework-only links (</a:t>
+            </a:r>
+            <a:r>
+              <a:rPr lang="en-US" sz="1200" kern="1200" dirty="0" err="1">
+                <a:solidFill>
+                  <a:schemeClr val="tx1"/>
+                </a:solidFill>
+                <a:latin typeface="+mn-lt"/>
+                <a:ea typeface="+mn-ea"/>
+                <a:cs typeface="+mn-cs"/>
+              </a:rPr>
+              <a:t>eg</a:t>
+            </a:r>
+            <a:r>
+              <a:rPr lang="en-US" sz="1200" kern="1200" dirty="0">
+                <a:solidFill>
+                  <a:schemeClr val="tx1"/>
+                </a:solidFill>
+                <a:latin typeface="+mn-lt"/>
+                <a:ea typeface="+mn-ea"/>
+                <a:cs typeface="+mn-cs"/>
+              </a:rPr>
+              <a:t>. variously decorated benzene rings) are not useful.</a:t>
+            </a:r>
+          </a:p>
+          <a:p>
+            <a:pPr lvl="0"/>
+            <a:r>
+              <a:rPr lang="en-US" sz="1200" kern="1200" dirty="0">
+                <a:solidFill>
+                  <a:schemeClr val="tx1"/>
+                </a:solidFill>
+                <a:latin typeface="+mn-lt"/>
+                <a:ea typeface="+mn-ea"/>
+                <a:cs typeface="+mn-cs"/>
+              </a:rPr>
+              <a:t>The outliers are interesting: compounds in a rare </a:t>
+            </a:r>
+            <a:r>
+              <a:rPr lang="en-US" sz="1200" kern="1200" dirty="0" err="1">
+                <a:solidFill>
+                  <a:schemeClr val="tx1"/>
+                </a:solidFill>
+                <a:latin typeface="+mn-lt"/>
+                <a:ea typeface="+mn-ea"/>
+                <a:cs typeface="+mn-cs"/>
+              </a:rPr>
+              <a:t>tautomer</a:t>
+            </a:r>
+            <a:r>
+              <a:rPr lang="en-US" sz="1200" kern="1200" dirty="0">
+                <a:solidFill>
+                  <a:schemeClr val="tx1"/>
+                </a:solidFill>
+                <a:latin typeface="+mn-lt"/>
+                <a:ea typeface="+mn-ea"/>
+                <a:cs typeface="+mn-cs"/>
+              </a:rPr>
+              <a:t> are unified with the dominant one by the NCATS tool, but left as singletons by the frameworks. And compounds whose only link with other molecules would be </a:t>
+            </a:r>
+            <a:r>
+              <a:rPr lang="en-US" sz="1200" kern="1200" dirty="0" err="1">
+                <a:solidFill>
+                  <a:schemeClr val="tx1"/>
+                </a:solidFill>
+                <a:latin typeface="+mn-lt"/>
+                <a:ea typeface="+mn-ea"/>
+                <a:cs typeface="+mn-cs"/>
+              </a:rPr>
+              <a:t>eg</a:t>
+            </a:r>
+            <a:r>
+              <a:rPr lang="en-US" sz="1200" kern="1200" dirty="0">
+                <a:solidFill>
+                  <a:schemeClr val="tx1"/>
+                </a:solidFill>
+                <a:latin typeface="+mn-lt"/>
+                <a:ea typeface="+mn-ea"/>
+                <a:cs typeface="+mn-cs"/>
+              </a:rPr>
+              <a:t>. a benzene ring remain singletons with the R-group tool.</a:t>
+            </a:r>
+          </a:p>
+          <a:p>
+            <a:endParaRPr lang="en-US" dirty="0"/>
+          </a:p>
+        </p:txBody>
+      </p:sp>
+      <p:sp>
+        <p:nvSpPr>
+          <p:cNvPr id="4" name="Slide Number Placeholder 3"/>
+          <p:cNvSpPr>
+            <a:spLocks noGrp="1"/>
+          </p:cNvSpPr>
+          <p:nvPr>
+            <p:ph type="sldNum" sz="quarter" idx="10"/>
+          </p:nvPr>
+        </p:nvSpPr>
+        <p:spPr/>
+        <p:txBody>
+          <a:bodyPr/>
+          <a:lstStyle/>
+          <a:p>
+            <a:fld id="{4C8C9167-E136-4C18-8FF2-A53C2728C27B}" type="slidenum">
+              <a:rPr lang="en-US" smtClean="0">
+                <a:solidFill>
+                  <a:prstClr val="black"/>
+                </a:solidFill>
+              </a:rPr>
+              <a:pPr/>
+              <a:t>4</a:t>
+            </a:fld>
+            <a:endParaRPr lang="en-US">
+              <a:solidFill>
+                <a:prstClr val="black"/>
+              </a:solidFill>
+            </a:endParaRPr>
+          </a:p>
+        </p:txBody>
+      </p:sp>
+    </p:spTree>
+    <p:extLst>
+      <p:ext uri="{BB962C8B-B14F-4D97-AF65-F5344CB8AC3E}">
+        <p14:creationId xmlns:p14="http://schemas.microsoft.com/office/powerpoint/2010/main" val="3191883655"/>
+      </p:ext>
+    </p:extLst>
   </p:cSld>
   <p:clrMapOvr>
     <a:masterClrMapping/>
@@ -702,10 +927,9 @@
           <a:lstStyle/>
           <a:p>
             <a:r>
-              <a:rPr lang="en-US" smtClean="0"/>
+              <a:rPr lang="en-US"/>
               <a:t>Click to edit Master title style</a:t>
             </a:r>
-            <a:endParaRPr lang="en-US"/>
           </a:p>
         </p:txBody>
       </p:sp>
@@ -821,10 +1045,9 @@
           </a:lstStyle>
           <a:p>
             <a:r>
-              <a:rPr lang="en-US" smtClean="0"/>
+              <a:rPr lang="en-US"/>
               <a:t>Click to edit Master subtitle style</a:t>
             </a:r>
-            <a:endParaRPr lang="en-US"/>
           </a:p>
         </p:txBody>
       </p:sp>
@@ -845,7 +1068,7 @@
           <a:p>
             <a:fld id="{339EFAEE-716A-4A3B-BEA5-CE1340F815D6}" type="datetimeFigureOut">
               <a:rPr lang="en-US" smtClean="0"/>
-              <a:t>10/1/2016</a:t>
+              <a:t>8/4/2018</a:t>
             </a:fld>
             <a:endParaRPr lang="en-US"/>
           </a:p>
@@ -934,10 +1157,9 @@
           <a:lstStyle/>
           <a:p>
             <a:r>
-              <a:rPr lang="en-US" smtClean="0"/>
+              <a:rPr lang="en-US"/>
               <a:t>Click to edit Master title style</a:t>
             </a:r>
-            <a:endParaRPr lang="en-US"/>
           </a:p>
         </p:txBody>
       </p:sp>
@@ -958,38 +1180,37 @@
           <a:p>
             <a:pPr lvl="0"/>
             <a:r>
-              <a:rPr lang="en-US" smtClean="0"/>
+              <a:rPr lang="en-US"/>
               <a:t>Click to edit Master text styles</a:t>
             </a:r>
           </a:p>
           <a:p>
             <a:pPr lvl="1"/>
             <a:r>
-              <a:rPr lang="en-US" smtClean="0"/>
+              <a:rPr lang="en-US"/>
               <a:t>Second level</a:t>
             </a:r>
           </a:p>
           <a:p>
             <a:pPr lvl="2"/>
             <a:r>
-              <a:rPr lang="en-US" smtClean="0"/>
+              <a:rPr lang="en-US"/>
               <a:t>Third level</a:t>
             </a:r>
           </a:p>
           <a:p>
             <a:pPr lvl="3"/>
             <a:r>
-              <a:rPr lang="en-US" smtClean="0"/>
+              <a:rPr lang="en-US"/>
               <a:t>Fourth level</a:t>
             </a:r>
           </a:p>
           <a:p>
             <a:pPr lvl="4"/>
             <a:r>
-              <a:rPr lang="en-US" smtClean="0"/>
+              <a:rPr lang="en-US"/>
               <a:t>Fifth level</a:t>
             </a:r>
-            <a:endParaRPr lang="en-US"/>
           </a:p>
         </p:txBody>
       </p:sp>
@@ -1010,7 +1231,7 @@
           <a:p>
             <a:fld id="{339EFAEE-716A-4A3B-BEA5-CE1340F815D6}" type="datetimeFigureOut">
               <a:rPr lang="en-US" smtClean="0"/>
-              <a:t>10/1/2016</a:t>
+              <a:t>8/4/2018</a:t>
             </a:fld>
             <a:endParaRPr lang="en-US"/>
           </a:p>
@@ -1104,10 +1325,9 @@
           <a:lstStyle/>
           <a:p>
             <a:r>
-              <a:rPr lang="en-US" smtClean="0"/>
+              <a:rPr lang="en-US"/>
               <a:t>Click to edit Master title style</a:t>
             </a:r>
-            <a:endParaRPr lang="en-US"/>
           </a:p>
         </p:txBody>
       </p:sp>
@@ -1133,38 +1353,37 @@
           <a:p>
             <a:pPr lvl="0"/>
             <a:r>
-              <a:rPr lang="en-US" smtClean="0"/>
+              <a:rPr lang="en-US"/>
               <a:t>Click to edit Master text styles</a:t>
             </a:r>
           </a:p>
           <a:p>
             <a:pPr lvl="1"/>
             <a:r>
-              <a:rPr lang="en-US" smtClean="0"/>
+              <a:rPr lang="en-US"/>
               <a:t>Second level</a:t>
             </a:r>
           </a:p>
           <a:p>
             <a:pPr lvl="2"/>
             <a:r>
-              <a:rPr lang="en-US" smtClean="0"/>
+              <a:rPr lang="en-US"/>
               <a:t>Third level</a:t>
             </a:r>
           </a:p>
           <a:p>
             <a:pPr lvl="3"/>
             <a:r>
-              <a:rPr lang="en-US" smtClean="0"/>
+              <a:rPr lang="en-US"/>
               <a:t>Fourth level</a:t>
             </a:r>
           </a:p>
           <a:p>
             <a:pPr lvl="4"/>
             <a:r>
-              <a:rPr lang="en-US" smtClean="0"/>
+              <a:rPr lang="en-US"/>
               <a:t>Fifth level</a:t>
             </a:r>
-            <a:endParaRPr lang="en-US"/>
           </a:p>
         </p:txBody>
       </p:sp>
@@ -1185,7 +1404,7 @@
           <a:p>
             <a:fld id="{339EFAEE-716A-4A3B-BEA5-CE1340F815D6}" type="datetimeFigureOut">
               <a:rPr lang="en-US" smtClean="0"/>
-              <a:t>10/1/2016</a:t>
+              <a:t>8/4/2018</a:t>
             </a:fld>
             <a:endParaRPr lang="en-US"/>
           </a:p>
@@ -1284,7 +1503,7 @@
             <a:blip r:embed="rId2" cstate="print">
               <a:extLst>
                 <a:ext uri="{28A0092B-C50C-407E-A947-70E740481C1C}">
-                  <a14:useLocalDpi xmlns="" xmlns:a14="http://schemas.microsoft.com/office/drawing/2010/main" val="0"/>
+                  <a14:useLocalDpi xmlns:a14="http://schemas.microsoft.com/office/drawing/2010/main" val="0"/>
                 </a:ext>
               </a:extLst>
             </a:blip>
@@ -1308,14 +1527,14 @@
             <a:effectLst/>
             <a:extLst>
               <a:ext uri="{909E8E84-426E-40DD-AFC4-6F175D3DCCD1}">
-                <a14:hiddenFill xmlns="" xmlns:a14="http://schemas.microsoft.com/office/drawing/2010/main">
+                <a14:hiddenFill xmlns:a14="http://schemas.microsoft.com/office/drawing/2010/main">
                   <a:solidFill>
                     <a:schemeClr val="accent1"/>
                   </a:solidFill>
                 </a14:hiddenFill>
               </a:ext>
               <a:ext uri="{91240B29-F687-4F45-9708-019B960494DF}">
-                <a14:hiddenLine xmlns="" xmlns:a14="http://schemas.microsoft.com/office/drawing/2010/main" w="9525">
+                <a14:hiddenLine xmlns:a14="http://schemas.microsoft.com/office/drawing/2010/main" w="9525">
                   <a:solidFill>
                     <a:schemeClr val="tx1"/>
                   </a:solidFill>
@@ -1325,7 +1544,7 @@
                 </a14:hiddenLine>
               </a:ext>
               <a:ext uri="{AF507438-7753-43E0-B8FC-AC1667EBCBE1}">
-                <a14:hiddenEffects xmlns="" xmlns:a14="http://schemas.microsoft.com/office/drawing/2010/main">
+                <a14:hiddenEffects xmlns:a14="http://schemas.microsoft.com/office/drawing/2010/main">
                   <a:effectLst>
                     <a:outerShdw dist="35921" dir="2700000" algn="ctr" rotWithShape="0">
                       <a:schemeClr val="bg2"/>
@@ -1348,7 +1567,7 @@
             <a:blip r:embed="rId3" cstate="print">
               <a:extLst>
                 <a:ext uri="{28A0092B-C50C-407E-A947-70E740481C1C}">
-                  <a14:useLocalDpi xmlns="" xmlns:a14="http://schemas.microsoft.com/office/drawing/2010/main" val="0"/>
+                  <a14:useLocalDpi xmlns:a14="http://schemas.microsoft.com/office/drawing/2010/main" val="0"/>
                 </a:ext>
               </a:extLst>
             </a:blip>
@@ -1379,7 +1598,7 @@
           <a:blip r:embed="rId4" cstate="print">
             <a:extLst>
               <a:ext uri="{28A0092B-C50C-407E-A947-70E740481C1C}">
-                <a14:useLocalDpi xmlns="" xmlns:a14="http://schemas.microsoft.com/office/drawing/2010/main" val="0"/>
+                <a14:useLocalDpi xmlns:a14="http://schemas.microsoft.com/office/drawing/2010/main" val="0"/>
               </a:ext>
             </a:extLst>
           </a:blip>
@@ -1431,7 +1650,7 @@
           </a:lstStyle>
           <a:p>
             <a:r>
-              <a:rPr lang="en-US" smtClean="0"/>
+              <a:rPr lang="en-US"/>
               <a:t>Click to edit Master title style</a:t>
             </a:r>
             <a:endParaRPr lang="en-GB" dirty="0"/>
@@ -1553,7 +1772,7 @@
           </a:lstStyle>
           <a:p>
             <a:r>
-              <a:rPr lang="en-US" smtClean="0"/>
+              <a:rPr lang="en-US"/>
               <a:t>Click to edit Master subtitle style</a:t>
             </a:r>
             <a:endParaRPr lang="en-GB" dirty="0"/>
@@ -1563,20 +1782,13 @@
     </p:spTree>
     <p:extLst>
       <p:ext uri="{BB962C8B-B14F-4D97-AF65-F5344CB8AC3E}">
-        <p14:creationId xmlns="" xmlns:p14="http://schemas.microsoft.com/office/powerpoint/2010/main" val="2661607094"/>
+        <p14:creationId xmlns:p14="http://schemas.microsoft.com/office/powerpoint/2010/main" val="2661607094"/>
       </p:ext>
     </p:extLst>
   </p:cSld>
   <p:clrMapOvr>
     <a:masterClrMapping/>
   </p:clrMapOvr>
-  <p:timing>
-    <p:tnLst>
-      <p:par>
-        <p:cTn id="1" dur="indefinite" restart="never" nodeType="tmRoot"/>
-      </p:par>
-    </p:tnLst>
-  </p:timing>
 </p:sldLayout>
 </file>
 
@@ -1618,7 +1830,7 @@
           <a:lstStyle/>
           <a:p>
             <a:r>
-              <a:rPr lang="en-US" smtClean="0"/>
+              <a:rPr lang="en-US"/>
               <a:t>Click to edit Master title style</a:t>
             </a:r>
             <a:endParaRPr lang="en-GB" dirty="0"/>
@@ -1683,35 +1895,35 @@
           <a:p>
             <a:pPr lvl="0"/>
             <a:r>
-              <a:rPr lang="en-US" smtClean="0"/>
+              <a:rPr lang="en-US"/>
               <a:t>Click to edit Master text styles</a:t>
             </a:r>
           </a:p>
           <a:p>
             <a:pPr lvl="1"/>
             <a:r>
-              <a:rPr lang="en-US" smtClean="0"/>
+              <a:rPr lang="en-US"/>
               <a:t>Second level</a:t>
             </a:r>
           </a:p>
           <a:p>
             <a:pPr lvl="2"/>
             <a:r>
-              <a:rPr lang="en-US" smtClean="0"/>
+              <a:rPr lang="en-US"/>
               <a:t>Third level</a:t>
             </a:r>
           </a:p>
           <a:p>
             <a:pPr lvl="3"/>
             <a:r>
-              <a:rPr lang="en-US" smtClean="0"/>
+              <a:rPr lang="en-US"/>
               <a:t>Fourth level</a:t>
             </a:r>
           </a:p>
           <a:p>
             <a:pPr lvl="4"/>
             <a:r>
-              <a:rPr lang="en-US" smtClean="0"/>
+              <a:rPr lang="en-US"/>
               <a:t>Fifth level</a:t>
             </a:r>
             <a:endParaRPr lang="en-GB" dirty="0"/>
@@ -1764,7 +1976,7 @@
           <a:p>
             <a:pPr lvl="0"/>
             <a:r>
-              <a:rPr lang="en-US" dirty="0" smtClean="0"/>
+              <a:rPr lang="en-US" dirty="0"/>
               <a:t>Subtitle here if required</a:t>
             </a:r>
           </a:p>
@@ -1893,7 +2105,7 @@
           <a:p>
             <a:pPr lvl="0"/>
             <a:r>
-              <a:rPr lang="en-US" dirty="0" smtClean="0"/>
+              <a:rPr lang="en-US" dirty="0"/>
               <a:t>Insert Source text here</a:t>
             </a:r>
           </a:p>
@@ -1902,20 +2114,13 @@
     </p:spTree>
     <p:extLst>
       <p:ext uri="{BB962C8B-B14F-4D97-AF65-F5344CB8AC3E}">
-        <p14:creationId xmlns="" xmlns:p14="http://schemas.microsoft.com/office/powerpoint/2010/main" val="3314054882"/>
+        <p14:creationId xmlns:p14="http://schemas.microsoft.com/office/powerpoint/2010/main" val="3314054882"/>
       </p:ext>
     </p:extLst>
   </p:cSld>
   <p:clrMapOvr>
     <a:masterClrMapping/>
   </p:clrMapOvr>
-  <p:timing>
-    <p:tnLst>
-      <p:par>
-        <p:cTn id="1" dur="indefinite" restart="never" nodeType="tmRoot"/>
-      </p:par>
-    </p:tnLst>
-  </p:timing>
 </p:sldLayout>
 </file>
 
@@ -1957,7 +2162,7 @@
           <a:lstStyle/>
           <a:p>
             <a:r>
-              <a:rPr lang="en-US" smtClean="0"/>
+              <a:rPr lang="en-US"/>
               <a:t>Click to edit Master title style</a:t>
             </a:r>
             <a:endParaRPr lang="en-GB" dirty="0"/>
@@ -1986,35 +2191,35 @@
           <a:p>
             <a:pPr lvl="0"/>
             <a:r>
-              <a:rPr lang="en-US" smtClean="0"/>
+              <a:rPr lang="en-US"/>
               <a:t>Click to edit Master text styles</a:t>
             </a:r>
           </a:p>
           <a:p>
             <a:pPr lvl="1"/>
             <a:r>
-              <a:rPr lang="en-US" smtClean="0"/>
+              <a:rPr lang="en-US"/>
               <a:t>Second level</a:t>
             </a:r>
           </a:p>
           <a:p>
             <a:pPr lvl="2"/>
             <a:r>
-              <a:rPr lang="en-US" smtClean="0"/>
+              <a:rPr lang="en-US"/>
               <a:t>Third level</a:t>
             </a:r>
           </a:p>
           <a:p>
             <a:pPr lvl="3"/>
             <a:r>
-              <a:rPr lang="en-US" smtClean="0"/>
+              <a:rPr lang="en-US"/>
               <a:t>Fourth level</a:t>
             </a:r>
           </a:p>
           <a:p>
             <a:pPr lvl="4"/>
             <a:r>
-              <a:rPr lang="en-US" smtClean="0"/>
+              <a:rPr lang="en-US"/>
               <a:t>Fifth level</a:t>
             </a:r>
             <a:endParaRPr lang="en-GB" dirty="0"/>
@@ -2073,7 +2278,7 @@
           <a:p>
             <a:pPr lvl="0"/>
             <a:r>
-              <a:rPr lang="en-US" dirty="0" smtClean="0"/>
+              <a:rPr lang="en-US" dirty="0"/>
               <a:t>Subheading here if required</a:t>
             </a:r>
           </a:p>
@@ -2203,7 +2408,7 @@
           <a:p>
             <a:pPr lvl="0"/>
             <a:r>
-              <a:rPr lang="en-US" dirty="0" smtClean="0"/>
+              <a:rPr lang="en-US" dirty="0"/>
               <a:t>Subtitle here if required</a:t>
             </a:r>
           </a:p>
@@ -2254,7 +2459,7 @@
           <a:p>
             <a:pPr lvl="0"/>
             <a:r>
-              <a:rPr lang="en-US" dirty="0" smtClean="0"/>
+              <a:rPr lang="en-US" dirty="0"/>
               <a:t>Insert Source text here</a:t>
             </a:r>
           </a:p>
@@ -2263,20 +2468,13 @@
     </p:spTree>
     <p:extLst>
       <p:ext uri="{BB962C8B-B14F-4D97-AF65-F5344CB8AC3E}">
-        <p14:creationId xmlns="" xmlns:p14="http://schemas.microsoft.com/office/powerpoint/2010/main" val="3512332922"/>
+        <p14:creationId xmlns:p14="http://schemas.microsoft.com/office/powerpoint/2010/main" val="3512332922"/>
       </p:ext>
     </p:extLst>
   </p:cSld>
   <p:clrMapOvr>
     <a:masterClrMapping/>
   </p:clrMapOvr>
-  <p:timing>
-    <p:tnLst>
-      <p:par>
-        <p:cTn id="1" dur="indefinite" restart="never" nodeType="tmRoot"/>
-      </p:par>
-    </p:tnLst>
-  </p:timing>
 </p:sldLayout>
 </file>
 
@@ -2318,7 +2516,7 @@
           <a:lstStyle/>
           <a:p>
             <a:r>
-              <a:rPr lang="en-US" smtClean="0"/>
+              <a:rPr lang="en-US"/>
               <a:t>Click to edit Master title style</a:t>
             </a:r>
             <a:endParaRPr lang="en-GB" dirty="0"/>
@@ -2363,35 +2561,35 @@
           <a:p>
             <a:pPr lvl="0"/>
             <a:r>
-              <a:rPr lang="en-US" smtClean="0"/>
+              <a:rPr lang="en-US"/>
               <a:t>Click to edit Master text styles</a:t>
             </a:r>
           </a:p>
           <a:p>
             <a:pPr lvl="1"/>
             <a:r>
-              <a:rPr lang="en-US" smtClean="0"/>
+              <a:rPr lang="en-US"/>
               <a:t>Second level</a:t>
             </a:r>
           </a:p>
           <a:p>
             <a:pPr lvl="2"/>
             <a:r>
-              <a:rPr lang="en-US" smtClean="0"/>
+              <a:rPr lang="en-US"/>
               <a:t>Third level</a:t>
             </a:r>
           </a:p>
           <a:p>
             <a:pPr lvl="3"/>
             <a:r>
-              <a:rPr lang="en-US" smtClean="0"/>
+              <a:rPr lang="en-US"/>
               <a:t>Fourth level</a:t>
             </a:r>
           </a:p>
           <a:p>
             <a:pPr lvl="4"/>
             <a:r>
-              <a:rPr lang="en-US" smtClean="0"/>
+              <a:rPr lang="en-US"/>
               <a:t>Fifth level</a:t>
             </a:r>
             <a:endParaRPr lang="en-GB" dirty="0"/>
@@ -2522,7 +2720,7 @@
           <a:p>
             <a:pPr lvl="0"/>
             <a:r>
-              <a:rPr lang="en-US" dirty="0" smtClean="0"/>
+              <a:rPr lang="en-US" dirty="0"/>
               <a:t>Subtitle here if required</a:t>
             </a:r>
           </a:p>
@@ -2573,7 +2771,7 @@
           <a:p>
             <a:pPr lvl="0"/>
             <a:r>
-              <a:rPr lang="en-US" dirty="0" smtClean="0"/>
+              <a:rPr lang="en-US" dirty="0"/>
               <a:t>Insert Source text here</a:t>
             </a:r>
           </a:p>
@@ -2582,20 +2780,13 @@
     </p:spTree>
     <p:extLst>
       <p:ext uri="{BB962C8B-B14F-4D97-AF65-F5344CB8AC3E}">
-        <p14:creationId xmlns="" xmlns:p14="http://schemas.microsoft.com/office/powerpoint/2010/main" val="3317225160"/>
+        <p14:creationId xmlns:p14="http://schemas.microsoft.com/office/powerpoint/2010/main" val="3317225160"/>
       </p:ext>
     </p:extLst>
   </p:cSld>
   <p:clrMapOvr>
     <a:masterClrMapping/>
   </p:clrMapOvr>
-  <p:timing>
-    <p:tnLst>
-      <p:par>
-        <p:cTn id="1" dur="indefinite" restart="never" nodeType="tmRoot"/>
-      </p:par>
-    </p:tnLst>
-  </p:timing>
 </p:sldLayout>
 </file>
 
@@ -2628,7 +2819,7 @@
           <a:blip r:embed="rId2" cstate="print">
             <a:extLst>
               <a:ext uri="{28A0092B-C50C-407E-A947-70E740481C1C}">
-                <a14:useLocalDpi xmlns="" xmlns:a14="http://schemas.microsoft.com/office/drawing/2010/main" val="0"/>
+                <a14:useLocalDpi xmlns:a14="http://schemas.microsoft.com/office/drawing/2010/main" val="0"/>
               </a:ext>
             </a:extLst>
           </a:blip>
@@ -2725,7 +2916,7 @@
           <a:p>
             <a:pPr lvl="0"/>
             <a:r>
-              <a:rPr lang="en-US" dirty="0" smtClean="0"/>
+              <a:rPr lang="en-US" dirty="0"/>
               <a:t>Subtitle here if required</a:t>
             </a:r>
           </a:p>
@@ -2802,7 +2993,7 @@
           <a:p>
             <a:pPr lvl="0"/>
             <a:r>
-              <a:rPr lang="en-US" dirty="0" smtClean="0"/>
+              <a:rPr lang="en-US" dirty="0"/>
               <a:t>Section Header title here</a:t>
             </a:r>
           </a:p>
@@ -2876,7 +3067,7 @@
           <a:p>
             <a:pPr lvl="0"/>
             <a:r>
-              <a:rPr lang="en-US" dirty="0" smtClean="0"/>
+              <a:rPr lang="en-US" dirty="0"/>
               <a:t>Type your statement text here</a:t>
             </a:r>
           </a:p>
@@ -2894,7 +3085,7 @@
           <a:blip r:embed="rId3" cstate="print">
             <a:extLst>
               <a:ext uri="{28A0092B-C50C-407E-A947-70E740481C1C}">
-                <a14:useLocalDpi xmlns="" xmlns:a14="http://schemas.microsoft.com/office/drawing/2010/main" val="0"/>
+                <a14:useLocalDpi xmlns:a14="http://schemas.microsoft.com/office/drawing/2010/main" val="0"/>
               </a:ext>
             </a:extLst>
           </a:blip>
@@ -2915,20 +3106,13 @@
     </p:spTree>
     <p:extLst>
       <p:ext uri="{BB962C8B-B14F-4D97-AF65-F5344CB8AC3E}">
-        <p14:creationId xmlns="" xmlns:p14="http://schemas.microsoft.com/office/powerpoint/2010/main" val="33665924"/>
+        <p14:creationId xmlns:p14="http://schemas.microsoft.com/office/powerpoint/2010/main" val="33665924"/>
       </p:ext>
     </p:extLst>
   </p:cSld>
   <p:clrMapOvr>
     <a:masterClrMapping/>
   </p:clrMapOvr>
-  <p:timing>
-    <p:tnLst>
-      <p:par>
-        <p:cTn id="1" dur="indefinite" restart="never" nodeType="tmRoot"/>
-      </p:par>
-    </p:tnLst>
-  </p:timing>
 </p:sldLayout>
 </file>
 
@@ -2970,7 +3154,7 @@
           <a:lstStyle/>
           <a:p>
             <a:r>
-              <a:rPr lang="en-US" smtClean="0"/>
+              <a:rPr lang="en-US"/>
               <a:t>Click to edit Master title style</a:t>
             </a:r>
             <a:endParaRPr lang="en-GB" dirty="0"/>
@@ -2999,35 +3183,35 @@
           <a:p>
             <a:pPr lvl="0"/>
             <a:r>
-              <a:rPr lang="en-US" smtClean="0"/>
+              <a:rPr lang="en-US"/>
               <a:t>Click to edit Master text styles</a:t>
             </a:r>
           </a:p>
           <a:p>
             <a:pPr lvl="1"/>
             <a:r>
-              <a:rPr lang="en-US" smtClean="0"/>
+              <a:rPr lang="en-US"/>
               <a:t>Second level</a:t>
             </a:r>
           </a:p>
           <a:p>
             <a:pPr lvl="2"/>
             <a:r>
-              <a:rPr lang="en-US" smtClean="0"/>
+              <a:rPr lang="en-US"/>
               <a:t>Third level</a:t>
             </a:r>
           </a:p>
           <a:p>
             <a:pPr lvl="3"/>
             <a:r>
-              <a:rPr lang="en-US" smtClean="0"/>
+              <a:rPr lang="en-US"/>
               <a:t>Fourth level</a:t>
             </a:r>
           </a:p>
           <a:p>
             <a:pPr lvl="4"/>
             <a:r>
-              <a:rPr lang="en-US" smtClean="0"/>
+              <a:rPr lang="en-US"/>
               <a:t>Fifth level</a:t>
             </a:r>
             <a:endParaRPr lang="en-GB" dirty="0"/>
@@ -3056,35 +3240,35 @@
           <a:p>
             <a:pPr lvl="0"/>
             <a:r>
-              <a:rPr lang="en-US" smtClean="0"/>
+              <a:rPr lang="en-US"/>
               <a:t>Click to edit Master text styles</a:t>
             </a:r>
           </a:p>
           <a:p>
             <a:pPr lvl="1"/>
             <a:r>
-              <a:rPr lang="en-US" smtClean="0"/>
+              <a:rPr lang="en-US"/>
               <a:t>Second level</a:t>
             </a:r>
           </a:p>
           <a:p>
             <a:pPr lvl="2"/>
             <a:r>
-              <a:rPr lang="en-US" smtClean="0"/>
+              <a:rPr lang="en-US"/>
               <a:t>Third level</a:t>
             </a:r>
           </a:p>
           <a:p>
             <a:pPr lvl="3"/>
             <a:r>
-              <a:rPr lang="en-US" smtClean="0"/>
+              <a:rPr lang="en-US"/>
               <a:t>Fourth level</a:t>
             </a:r>
           </a:p>
           <a:p>
             <a:pPr lvl="4"/>
             <a:r>
-              <a:rPr lang="en-US" smtClean="0"/>
+              <a:rPr lang="en-US"/>
               <a:t>Fifth level</a:t>
             </a:r>
             <a:endParaRPr lang="en-GB" dirty="0"/>
@@ -3215,7 +3399,7 @@
           <a:p>
             <a:pPr lvl="0"/>
             <a:r>
-              <a:rPr lang="en-US" dirty="0" smtClean="0"/>
+              <a:rPr lang="en-US" dirty="0"/>
               <a:t>Subtitle here if required</a:t>
             </a:r>
           </a:p>
@@ -3266,7 +3450,7 @@
           <a:p>
             <a:pPr lvl="0"/>
             <a:r>
-              <a:rPr lang="en-US" dirty="0" smtClean="0"/>
+              <a:rPr lang="en-US" dirty="0"/>
               <a:t>Insert Source text here</a:t>
             </a:r>
           </a:p>
@@ -3317,7 +3501,7 @@
           <a:p>
             <a:pPr lvl="0"/>
             <a:r>
-              <a:rPr lang="en-US" dirty="0" smtClean="0"/>
+              <a:rPr lang="en-US" dirty="0"/>
               <a:t>Insert Source text here</a:t>
             </a:r>
           </a:p>
@@ -3326,20 +3510,13 @@
     </p:spTree>
     <p:extLst>
       <p:ext uri="{BB962C8B-B14F-4D97-AF65-F5344CB8AC3E}">
-        <p14:creationId xmlns="" xmlns:p14="http://schemas.microsoft.com/office/powerpoint/2010/main" val="3706052572"/>
+        <p14:creationId xmlns:p14="http://schemas.microsoft.com/office/powerpoint/2010/main" val="3706052572"/>
       </p:ext>
     </p:extLst>
   </p:cSld>
   <p:clrMapOvr>
     <a:masterClrMapping/>
   </p:clrMapOvr>
-  <p:timing>
-    <p:tnLst>
-      <p:par>
-        <p:cTn id="1" dur="indefinite" restart="never" nodeType="tmRoot"/>
-      </p:par>
-    </p:tnLst>
-  </p:timing>
 </p:sldLayout>
 </file>
 
@@ -3381,7 +3558,7 @@
           <a:lstStyle/>
           <a:p>
             <a:r>
-              <a:rPr lang="en-US" smtClean="0"/>
+              <a:rPr lang="en-US"/>
               <a:t>Click to edit Master title style</a:t>
             </a:r>
             <a:endParaRPr lang="en-GB" dirty="0"/>
@@ -3453,7 +3630,7 @@
           <a:p>
             <a:pPr lvl="0"/>
             <a:r>
-              <a:rPr lang="en-US" smtClean="0"/>
+              <a:rPr lang="en-US"/>
               <a:t>Click to edit Master text styles</a:t>
             </a:r>
           </a:p>
@@ -3511,35 +3688,35 @@
           <a:p>
             <a:pPr lvl="0"/>
             <a:r>
-              <a:rPr lang="en-US" smtClean="0"/>
+              <a:rPr lang="en-US"/>
               <a:t>Click to edit Master text styles</a:t>
             </a:r>
           </a:p>
           <a:p>
             <a:pPr lvl="1"/>
             <a:r>
-              <a:rPr lang="en-US" smtClean="0"/>
+              <a:rPr lang="en-US"/>
               <a:t>Second level</a:t>
             </a:r>
           </a:p>
           <a:p>
             <a:pPr lvl="2"/>
             <a:r>
-              <a:rPr lang="en-US" smtClean="0"/>
+              <a:rPr lang="en-US"/>
               <a:t>Third level</a:t>
             </a:r>
           </a:p>
           <a:p>
             <a:pPr lvl="3"/>
             <a:r>
-              <a:rPr lang="en-US" smtClean="0"/>
+              <a:rPr lang="en-US"/>
               <a:t>Fourth level</a:t>
             </a:r>
           </a:p>
           <a:p>
             <a:pPr lvl="4"/>
             <a:r>
-              <a:rPr lang="en-US" smtClean="0"/>
+              <a:rPr lang="en-US"/>
               <a:t>Fifth level</a:t>
             </a:r>
             <a:endParaRPr lang="en-GB" dirty="0"/>
@@ -3611,7 +3788,7 @@
           <a:p>
             <a:pPr lvl="0"/>
             <a:r>
-              <a:rPr lang="en-US" smtClean="0"/>
+              <a:rPr lang="en-US"/>
               <a:t>Click to edit Master text styles</a:t>
             </a:r>
           </a:p>
@@ -3669,35 +3846,35 @@
           <a:p>
             <a:pPr lvl="0"/>
             <a:r>
-              <a:rPr lang="en-US" smtClean="0"/>
+              <a:rPr lang="en-US"/>
               <a:t>Click to edit Master text styles</a:t>
             </a:r>
           </a:p>
           <a:p>
             <a:pPr lvl="1"/>
             <a:r>
-              <a:rPr lang="en-US" smtClean="0"/>
+              <a:rPr lang="en-US"/>
               <a:t>Second level</a:t>
             </a:r>
           </a:p>
           <a:p>
             <a:pPr lvl="2"/>
             <a:r>
-              <a:rPr lang="en-US" smtClean="0"/>
+              <a:rPr lang="en-US"/>
               <a:t>Third level</a:t>
             </a:r>
           </a:p>
           <a:p>
             <a:pPr lvl="3"/>
             <a:r>
-              <a:rPr lang="en-US" smtClean="0"/>
+              <a:rPr lang="en-US"/>
               <a:t>Fourth level</a:t>
             </a:r>
           </a:p>
           <a:p>
             <a:pPr lvl="4"/>
             <a:r>
-              <a:rPr lang="en-US" smtClean="0"/>
+              <a:rPr lang="en-US"/>
               <a:t>Fifth level</a:t>
             </a:r>
             <a:endParaRPr lang="en-GB" dirty="0"/>
@@ -3828,7 +4005,7 @@
           <a:p>
             <a:pPr lvl="0"/>
             <a:r>
-              <a:rPr lang="en-US" dirty="0" smtClean="0"/>
+              <a:rPr lang="en-US" dirty="0"/>
               <a:t>Subtitle here if required</a:t>
             </a:r>
           </a:p>
@@ -3879,7 +4056,7 @@
           <a:p>
             <a:pPr lvl="0"/>
             <a:r>
-              <a:rPr lang="en-US" dirty="0" smtClean="0"/>
+              <a:rPr lang="en-US" dirty="0"/>
               <a:t>Insert Source text here</a:t>
             </a:r>
           </a:p>
@@ -3930,7 +4107,7 @@
           <a:p>
             <a:pPr lvl="0"/>
             <a:r>
-              <a:rPr lang="en-US" dirty="0" smtClean="0"/>
+              <a:rPr lang="en-US" dirty="0"/>
               <a:t>Insert Source text here</a:t>
             </a:r>
           </a:p>
@@ -3939,20 +4116,13 @@
     </p:spTree>
     <p:extLst>
       <p:ext uri="{BB962C8B-B14F-4D97-AF65-F5344CB8AC3E}">
-        <p14:creationId xmlns="" xmlns:p14="http://schemas.microsoft.com/office/powerpoint/2010/main" val="3618036633"/>
+        <p14:creationId xmlns:p14="http://schemas.microsoft.com/office/powerpoint/2010/main" val="3618036633"/>
       </p:ext>
     </p:extLst>
   </p:cSld>
   <p:clrMapOvr>
     <a:masterClrMapping/>
   </p:clrMapOvr>
-  <p:timing>
-    <p:tnLst>
-      <p:par>
-        <p:cTn id="1" dur="indefinite" restart="never" nodeType="tmRoot"/>
-      </p:par>
-    </p:tnLst>
-  </p:timing>
 </p:sldLayout>
 </file>
 
@@ -4003,10 +4173,9 @@
           </a:lstStyle>
           <a:p>
             <a:r>
-              <a:rPr lang="en-GB" dirty="0" smtClean="0"/>
+              <a:rPr lang="en-GB" dirty="0"/>
               <a:t>Click on the film icon to insert your Standard (4x3 video)</a:t>
             </a:r>
-            <a:endParaRPr lang="en-GB" dirty="0"/>
           </a:p>
         </p:txBody>
       </p:sp>
@@ -4039,7 +4208,7 @@
           </a:lstStyle>
           <a:p>
             <a:r>
-              <a:rPr lang="en-US" smtClean="0"/>
+              <a:rPr lang="en-US"/>
               <a:t>Click to edit Master title style</a:t>
             </a:r>
             <a:endParaRPr lang="en-GB" dirty="0"/>
@@ -4170,7 +4339,7 @@
           <a:p>
             <a:pPr lvl="0"/>
             <a:r>
-              <a:rPr lang="en-US" dirty="0" smtClean="0"/>
+              <a:rPr lang="en-US" dirty="0"/>
               <a:t>Subtitle here if required</a:t>
             </a:r>
           </a:p>
@@ -4179,20 +4348,13 @@
     </p:spTree>
     <p:extLst>
       <p:ext uri="{BB962C8B-B14F-4D97-AF65-F5344CB8AC3E}">
-        <p14:creationId xmlns="" xmlns:p14="http://schemas.microsoft.com/office/powerpoint/2010/main" val="2851349190"/>
+        <p14:creationId xmlns:p14="http://schemas.microsoft.com/office/powerpoint/2010/main" val="2851349190"/>
       </p:ext>
     </p:extLst>
   </p:cSld>
   <p:clrMapOvr>
     <a:masterClrMapping/>
   </p:clrMapOvr>
-  <p:timing>
-    <p:tnLst>
-      <p:par>
-        <p:cTn id="1" dur="indefinite" restart="never" nodeType="tmRoot"/>
-      </p:par>
-    </p:tnLst>
-  </p:timing>
 </p:sldLayout>
 </file>
 
@@ -4229,10 +4391,9 @@
           <a:lstStyle/>
           <a:p>
             <a:r>
-              <a:rPr lang="en-US" smtClean="0"/>
+              <a:rPr lang="en-US"/>
               <a:t>Click to edit Master title style</a:t>
             </a:r>
-            <a:endParaRPr lang="en-US"/>
           </a:p>
         </p:txBody>
       </p:sp>
@@ -4253,38 +4414,37 @@
           <a:p>
             <a:pPr lvl="0"/>
             <a:r>
-              <a:rPr lang="en-US" smtClean="0"/>
+              <a:rPr lang="en-US"/>
               <a:t>Click to edit Master text styles</a:t>
             </a:r>
           </a:p>
           <a:p>
             <a:pPr lvl="1"/>
             <a:r>
-              <a:rPr lang="en-US" smtClean="0"/>
+              <a:rPr lang="en-US"/>
               <a:t>Second level</a:t>
             </a:r>
           </a:p>
           <a:p>
             <a:pPr lvl="2"/>
             <a:r>
-              <a:rPr lang="en-US" smtClean="0"/>
+              <a:rPr lang="en-US"/>
               <a:t>Third level</a:t>
             </a:r>
           </a:p>
           <a:p>
             <a:pPr lvl="3"/>
             <a:r>
-              <a:rPr lang="en-US" smtClean="0"/>
+              <a:rPr lang="en-US"/>
               <a:t>Fourth level</a:t>
             </a:r>
           </a:p>
           <a:p>
             <a:pPr lvl="4"/>
             <a:r>
-              <a:rPr lang="en-US" smtClean="0"/>
+              <a:rPr lang="en-US"/>
               <a:t>Fifth level</a:t>
             </a:r>
-            <a:endParaRPr lang="en-US"/>
           </a:p>
         </p:txBody>
       </p:sp>
@@ -4305,7 +4465,7 @@
           <a:p>
             <a:fld id="{339EFAEE-716A-4A3B-BEA5-CE1340F815D6}" type="datetimeFigureOut">
               <a:rPr lang="en-US" smtClean="0"/>
-              <a:t>10/1/2016</a:t>
+              <a:t>8/4/2018</a:t>
             </a:fld>
             <a:endParaRPr lang="en-US"/>
           </a:p>
@@ -4408,10 +4568,9 @@
           </a:lstStyle>
           <a:p>
             <a:r>
-              <a:rPr lang="en-GB" dirty="0" smtClean="0"/>
+              <a:rPr lang="en-GB" dirty="0"/>
               <a:t>Click on the film icon to insert your widescreen (16x9) video</a:t>
             </a:r>
-            <a:endParaRPr lang="en-GB" dirty="0"/>
           </a:p>
         </p:txBody>
       </p:sp>
@@ -4444,7 +4603,7 @@
           </a:lstStyle>
           <a:p>
             <a:r>
-              <a:rPr lang="en-US" smtClean="0"/>
+              <a:rPr lang="en-US"/>
               <a:t>Click to edit Master title style</a:t>
             </a:r>
             <a:endParaRPr lang="en-GB" dirty="0"/>
@@ -4575,7 +4734,7 @@
           <a:p>
             <a:pPr lvl="0"/>
             <a:r>
-              <a:rPr lang="en-US" dirty="0" smtClean="0"/>
+              <a:rPr lang="en-US" dirty="0"/>
               <a:t>Subtitle here if required</a:t>
             </a:r>
           </a:p>
@@ -4584,20 +4743,13 @@
     </p:spTree>
     <p:extLst>
       <p:ext uri="{BB962C8B-B14F-4D97-AF65-F5344CB8AC3E}">
-        <p14:creationId xmlns="" xmlns:p14="http://schemas.microsoft.com/office/powerpoint/2010/main" val="2599322777"/>
+        <p14:creationId xmlns:p14="http://schemas.microsoft.com/office/powerpoint/2010/main" val="2599322777"/>
       </p:ext>
     </p:extLst>
   </p:cSld>
   <p:clrMapOvr>
     <a:masterClrMapping/>
   </p:clrMapOvr>
-  <p:timing>
-    <p:tnLst>
-      <p:par>
-        <p:cTn id="1" dur="indefinite" restart="never" nodeType="tmRoot"/>
-      </p:par>
-    </p:tnLst>
-  </p:timing>
 </p:sldLayout>
 </file>
 
@@ -4639,7 +4791,7 @@
           <a:lstStyle/>
           <a:p>
             <a:r>
-              <a:rPr lang="en-US" smtClean="0"/>
+              <a:rPr lang="en-US"/>
               <a:t>Click to edit Master title style</a:t>
             </a:r>
             <a:endParaRPr lang="en-GB" dirty="0"/>
@@ -4668,35 +4820,35 @@
           <a:p>
             <a:pPr lvl="0"/>
             <a:r>
-              <a:rPr lang="en-US" smtClean="0"/>
+              <a:rPr lang="en-US"/>
               <a:t>Click to edit Master text styles</a:t>
             </a:r>
           </a:p>
           <a:p>
             <a:pPr lvl="1"/>
             <a:r>
-              <a:rPr lang="en-US" smtClean="0"/>
+              <a:rPr lang="en-US"/>
               <a:t>Second level</a:t>
             </a:r>
           </a:p>
           <a:p>
             <a:pPr lvl="2"/>
             <a:r>
-              <a:rPr lang="en-US" smtClean="0"/>
+              <a:rPr lang="en-US"/>
               <a:t>Third level</a:t>
             </a:r>
           </a:p>
           <a:p>
             <a:pPr lvl="3"/>
             <a:r>
-              <a:rPr lang="en-US" smtClean="0"/>
+              <a:rPr lang="en-US"/>
               <a:t>Fourth level</a:t>
             </a:r>
           </a:p>
           <a:p>
             <a:pPr lvl="4"/>
             <a:r>
-              <a:rPr lang="en-US" smtClean="0"/>
+              <a:rPr lang="en-US"/>
               <a:t>Fifth level</a:t>
             </a:r>
             <a:endParaRPr lang="en-GB" dirty="0"/>
@@ -4729,10 +4881,9 @@
           </a:lstStyle>
           <a:p>
             <a:r>
-              <a:rPr lang="en-GB" dirty="0" smtClean="0"/>
+              <a:rPr lang="en-GB" dirty="0"/>
               <a:t>Click on the picture icon to insert your picture</a:t>
             </a:r>
-            <a:endParaRPr lang="en-GB" dirty="0"/>
           </a:p>
         </p:txBody>
       </p:sp>
@@ -4860,7 +5011,7 @@
           <a:p>
             <a:pPr lvl="0"/>
             <a:r>
-              <a:rPr lang="en-US" dirty="0" smtClean="0"/>
+              <a:rPr lang="en-US" dirty="0"/>
               <a:t>Subtitle here if required</a:t>
             </a:r>
           </a:p>
@@ -4929,7 +5080,7 @@
           <a:p>
             <a:pPr lvl="0"/>
             <a:r>
-              <a:rPr lang="en-US" dirty="0" smtClean="0"/>
+              <a:rPr lang="en-US" dirty="0"/>
               <a:t>Enter your image caption text here</a:t>
             </a:r>
           </a:p>
@@ -4938,20 +5089,13 @@
     </p:spTree>
     <p:extLst>
       <p:ext uri="{BB962C8B-B14F-4D97-AF65-F5344CB8AC3E}">
-        <p14:creationId xmlns="" xmlns:p14="http://schemas.microsoft.com/office/powerpoint/2010/main" val="3534580817"/>
+        <p14:creationId xmlns:p14="http://schemas.microsoft.com/office/powerpoint/2010/main" val="3534580817"/>
       </p:ext>
     </p:extLst>
   </p:cSld>
   <p:clrMapOvr>
     <a:masterClrMapping/>
   </p:clrMapOvr>
-  <p:timing>
-    <p:tnLst>
-      <p:par>
-        <p:cTn id="1" dur="indefinite" restart="never" nodeType="tmRoot"/>
-      </p:par>
-    </p:tnLst>
-  </p:timing>
 </p:sldLayout>
 </file>
 
@@ -4993,7 +5137,7 @@
           <a:lstStyle/>
           <a:p>
             <a:r>
-              <a:rPr lang="en-US" smtClean="0"/>
+              <a:rPr lang="en-US"/>
               <a:t>Click to edit Master title style</a:t>
             </a:r>
             <a:endParaRPr lang="en-GB" dirty="0"/>
@@ -5022,35 +5166,35 @@
           <a:p>
             <a:pPr lvl="0"/>
             <a:r>
-              <a:rPr lang="en-US" smtClean="0"/>
+              <a:rPr lang="en-US"/>
               <a:t>Click to edit Master text styles</a:t>
             </a:r>
           </a:p>
           <a:p>
             <a:pPr lvl="1"/>
             <a:r>
-              <a:rPr lang="en-US" smtClean="0"/>
+              <a:rPr lang="en-US"/>
               <a:t>Second level</a:t>
             </a:r>
           </a:p>
           <a:p>
             <a:pPr lvl="2"/>
             <a:r>
-              <a:rPr lang="en-US" smtClean="0"/>
+              <a:rPr lang="en-US"/>
               <a:t>Third level</a:t>
             </a:r>
           </a:p>
           <a:p>
             <a:pPr lvl="3"/>
             <a:r>
-              <a:rPr lang="en-US" smtClean="0"/>
+              <a:rPr lang="en-US"/>
               <a:t>Fourth level</a:t>
             </a:r>
           </a:p>
           <a:p>
             <a:pPr lvl="4"/>
             <a:r>
-              <a:rPr lang="en-US" smtClean="0"/>
+              <a:rPr lang="en-US"/>
               <a:t>Fifth level</a:t>
             </a:r>
             <a:endParaRPr lang="en-GB" dirty="0"/>
@@ -5181,7 +5325,7 @@
           <a:p>
             <a:pPr lvl="0"/>
             <a:r>
-              <a:rPr lang="en-US" dirty="0" smtClean="0"/>
+              <a:rPr lang="en-US" dirty="0"/>
               <a:t>Subtitle here if required</a:t>
             </a:r>
           </a:p>
@@ -5217,10 +5361,9 @@
           </a:lstStyle>
           <a:p>
             <a:r>
-              <a:rPr lang="en-GB" dirty="0" smtClean="0"/>
+              <a:rPr lang="en-GB" dirty="0"/>
               <a:t>Click on the picture icon to insert your picture</a:t>
             </a:r>
-            <a:endParaRPr lang="en-GB" dirty="0"/>
           </a:p>
         </p:txBody>
       </p:sp>
@@ -5287,7 +5430,7 @@
           <a:p>
             <a:pPr lvl="0"/>
             <a:r>
-              <a:rPr lang="en-US" dirty="0" smtClean="0"/>
+              <a:rPr lang="en-US" dirty="0"/>
               <a:t>Enter your image caption text here</a:t>
             </a:r>
           </a:p>
@@ -5323,10 +5466,9 @@
           </a:lstStyle>
           <a:p>
             <a:r>
-              <a:rPr lang="en-GB" dirty="0" smtClean="0"/>
+              <a:rPr lang="en-GB" dirty="0"/>
               <a:t>Click on the picture icon to insert your picture</a:t>
             </a:r>
-            <a:endParaRPr lang="en-GB" dirty="0"/>
           </a:p>
         </p:txBody>
       </p:sp>
@@ -5393,7 +5535,7 @@
           <a:p>
             <a:pPr lvl="0"/>
             <a:r>
-              <a:rPr lang="en-US" dirty="0" smtClean="0"/>
+              <a:rPr lang="en-US" dirty="0"/>
               <a:t>Enter your image caption text here</a:t>
             </a:r>
           </a:p>
@@ -5402,20 +5544,13 @@
     </p:spTree>
     <p:extLst>
       <p:ext uri="{BB962C8B-B14F-4D97-AF65-F5344CB8AC3E}">
-        <p14:creationId xmlns="" xmlns:p14="http://schemas.microsoft.com/office/powerpoint/2010/main" val="1127212296"/>
+        <p14:creationId xmlns:p14="http://schemas.microsoft.com/office/powerpoint/2010/main" val="1127212296"/>
       </p:ext>
     </p:extLst>
   </p:cSld>
   <p:clrMapOvr>
     <a:masterClrMapping/>
   </p:clrMapOvr>
-  <p:timing>
-    <p:tnLst>
-      <p:par>
-        <p:cTn id="1" dur="indefinite" restart="never" nodeType="tmRoot"/>
-      </p:par>
-    </p:tnLst>
-  </p:timing>
 </p:sldLayout>
 </file>
 
@@ -5457,7 +5592,7 @@
           <a:lstStyle/>
           <a:p>
             <a:r>
-              <a:rPr lang="en-US" smtClean="0"/>
+              <a:rPr lang="en-US"/>
               <a:t>Click to edit Master title style</a:t>
             </a:r>
             <a:endParaRPr lang="en-GB"/>
@@ -5588,7 +5723,7 @@
           <a:p>
             <a:pPr lvl="0"/>
             <a:r>
-              <a:rPr lang="en-US" dirty="0" smtClean="0"/>
+              <a:rPr lang="en-US" dirty="0"/>
               <a:t>Subtitle here if required</a:t>
             </a:r>
           </a:p>
@@ -5597,20 +5732,13 @@
     </p:spTree>
     <p:extLst>
       <p:ext uri="{BB962C8B-B14F-4D97-AF65-F5344CB8AC3E}">
-        <p14:creationId xmlns="" xmlns:p14="http://schemas.microsoft.com/office/powerpoint/2010/main" val="1769190964"/>
+        <p14:creationId xmlns:p14="http://schemas.microsoft.com/office/powerpoint/2010/main" val="1769190964"/>
       </p:ext>
     </p:extLst>
   </p:cSld>
   <p:clrMapOvr>
     <a:masterClrMapping/>
   </p:clrMapOvr>
-  <p:timing>
-    <p:tnLst>
-      <p:par>
-        <p:cTn id="1" dur="indefinite" restart="never" nodeType="tmRoot"/>
-      </p:par>
-    </p:tnLst>
-  </p:timing>
 </p:sldLayout>
 </file>
 
@@ -5747,20 +5875,13 @@
     </p:spTree>
     <p:extLst>
       <p:ext uri="{BB962C8B-B14F-4D97-AF65-F5344CB8AC3E}">
-        <p14:creationId xmlns="" xmlns:p14="http://schemas.microsoft.com/office/powerpoint/2010/main" val="1448223630"/>
+        <p14:creationId xmlns:p14="http://schemas.microsoft.com/office/powerpoint/2010/main" val="1448223630"/>
       </p:ext>
     </p:extLst>
   </p:cSld>
   <p:clrMapOvr>
     <a:masterClrMapping/>
   </p:clrMapOvr>
-  <p:timing>
-    <p:tnLst>
-      <p:par>
-        <p:cTn id="1" dur="indefinite" restart="never" nodeType="tmRoot"/>
-      </p:par>
-    </p:tnLst>
-  </p:timing>
 </p:sldLayout>
 </file>
 
@@ -5797,10 +5918,9 @@
           <a:lstStyle/>
           <a:p>
             <a:r>
-              <a:rPr lang="en-US" smtClean="0"/>
+              <a:rPr lang="en-US"/>
               <a:t>Click to edit Master title style</a:t>
             </a:r>
-            <a:endParaRPr lang="en-US"/>
           </a:p>
         </p:txBody>
       </p:sp>
@@ -5821,38 +5941,37 @@
           <a:p>
             <a:pPr lvl="0"/>
             <a:r>
-              <a:rPr lang="en-US" smtClean="0"/>
+              <a:rPr lang="en-US"/>
               <a:t>Click to edit Master text styles</a:t>
             </a:r>
           </a:p>
           <a:p>
             <a:pPr lvl="1"/>
             <a:r>
-              <a:rPr lang="en-US" smtClean="0"/>
+              <a:rPr lang="en-US"/>
               <a:t>Second level</a:t>
             </a:r>
           </a:p>
           <a:p>
             <a:pPr lvl="2"/>
             <a:r>
-              <a:rPr lang="en-US" smtClean="0"/>
+              <a:rPr lang="en-US"/>
               <a:t>Third level</a:t>
             </a:r>
           </a:p>
           <a:p>
             <a:pPr lvl="3"/>
             <a:r>
-              <a:rPr lang="en-US" smtClean="0"/>
+              <a:rPr lang="en-US"/>
               <a:t>Fourth level</a:t>
             </a:r>
           </a:p>
           <a:p>
             <a:pPr lvl="4"/>
             <a:r>
-              <a:rPr lang="en-US" smtClean="0"/>
+              <a:rPr lang="en-US"/>
               <a:t>Fifth level</a:t>
             </a:r>
-            <a:endParaRPr lang="en-US"/>
           </a:p>
         </p:txBody>
       </p:sp>
@@ -5983,10 +6102,9 @@
           <a:lstStyle/>
           <a:p>
             <a:r>
-              <a:rPr lang="en-US" smtClean="0"/>
+              <a:rPr lang="en-US"/>
               <a:t>Click to edit Master title style</a:t>
             </a:r>
-            <a:endParaRPr lang="en-US"/>
           </a:p>
         </p:txBody>
       </p:sp>
@@ -6012,38 +6130,37 @@
           <a:p>
             <a:pPr lvl="0"/>
             <a:r>
-              <a:rPr lang="en-US" smtClean="0"/>
+              <a:rPr lang="en-US"/>
               <a:t>Click to edit Master text styles</a:t>
             </a:r>
           </a:p>
           <a:p>
             <a:pPr lvl="1"/>
             <a:r>
-              <a:rPr lang="en-US" smtClean="0"/>
+              <a:rPr lang="en-US"/>
               <a:t>Second level</a:t>
             </a:r>
           </a:p>
           <a:p>
             <a:pPr lvl="2"/>
             <a:r>
-              <a:rPr lang="en-US" smtClean="0"/>
+              <a:rPr lang="en-US"/>
               <a:t>Third level</a:t>
             </a:r>
           </a:p>
           <a:p>
             <a:pPr lvl="3"/>
             <a:r>
-              <a:rPr lang="en-US" smtClean="0"/>
+              <a:rPr lang="en-US"/>
               <a:t>Fourth level</a:t>
             </a:r>
           </a:p>
           <a:p>
             <a:pPr lvl="4"/>
             <a:r>
-              <a:rPr lang="en-US" smtClean="0"/>
+              <a:rPr lang="en-US"/>
               <a:t>Fifth level</a:t>
             </a:r>
-            <a:endParaRPr lang="en-US"/>
           </a:p>
         </p:txBody>
       </p:sp>
@@ -6069,38 +6186,37 @@
           <a:p>
             <a:pPr lvl="0"/>
             <a:r>
-              <a:rPr lang="en-US" smtClean="0"/>
+              <a:rPr lang="en-US"/>
               <a:t>Click to edit Master text styles</a:t>
             </a:r>
           </a:p>
           <a:p>
             <a:pPr lvl="1"/>
             <a:r>
-              <a:rPr lang="en-US" smtClean="0"/>
+              <a:rPr lang="en-US"/>
               <a:t>Second level</a:t>
             </a:r>
           </a:p>
           <a:p>
             <a:pPr lvl="2"/>
             <a:r>
-              <a:rPr lang="en-US" smtClean="0"/>
+              <a:rPr lang="en-US"/>
               <a:t>Third level</a:t>
             </a:r>
           </a:p>
           <a:p>
             <a:pPr lvl="3"/>
             <a:r>
-              <a:rPr lang="en-US" smtClean="0"/>
+              <a:rPr lang="en-US"/>
               <a:t>Fourth level</a:t>
             </a:r>
           </a:p>
           <a:p>
             <a:pPr lvl="4"/>
             <a:r>
-              <a:rPr lang="en-US" smtClean="0"/>
+              <a:rPr lang="en-US"/>
               <a:t>Fifth level</a:t>
             </a:r>
-            <a:endParaRPr lang="en-US"/>
           </a:p>
         </p:txBody>
       </p:sp>
@@ -6126,38 +6242,37 @@
           <a:p>
             <a:pPr lvl="0"/>
             <a:r>
-              <a:rPr lang="en-US" smtClean="0"/>
+              <a:rPr lang="en-US"/>
               <a:t>Click to edit Master text styles</a:t>
             </a:r>
           </a:p>
           <a:p>
             <a:pPr lvl="1"/>
             <a:r>
-              <a:rPr lang="en-US" smtClean="0"/>
+              <a:rPr lang="en-US"/>
               <a:t>Second level</a:t>
             </a:r>
           </a:p>
           <a:p>
             <a:pPr lvl="2"/>
             <a:r>
-              <a:rPr lang="en-US" smtClean="0"/>
+              <a:rPr lang="en-US"/>
               <a:t>Third level</a:t>
             </a:r>
           </a:p>
           <a:p>
             <a:pPr lvl="3"/>
             <a:r>
-              <a:rPr lang="en-US" smtClean="0"/>
+              <a:rPr lang="en-US"/>
               <a:t>Fourth level</a:t>
             </a:r>
           </a:p>
           <a:p>
             <a:pPr lvl="4"/>
             <a:r>
-              <a:rPr lang="en-US" smtClean="0"/>
+              <a:rPr lang="en-US"/>
               <a:t>Fifth level</a:t>
             </a:r>
-            <a:endParaRPr lang="en-US"/>
           </a:p>
         </p:txBody>
       </p:sp>
@@ -6203,10 +6318,9 @@
           <a:lstStyle/>
           <a:p>
             <a:r>
-              <a:rPr lang="en-US" smtClean="0"/>
+              <a:rPr lang="en-US"/>
               <a:t>Click to edit Master title style</a:t>
             </a:r>
-            <a:endParaRPr lang="en-US"/>
           </a:p>
         </p:txBody>
       </p:sp>
@@ -6260,38 +6374,37 @@
           <a:p>
             <a:pPr lvl="0"/>
             <a:r>
-              <a:rPr lang="en-US" smtClean="0"/>
+              <a:rPr lang="en-US"/>
               <a:t>Click to edit Master text styles</a:t>
             </a:r>
           </a:p>
           <a:p>
             <a:pPr lvl="1"/>
             <a:r>
-              <a:rPr lang="en-US" smtClean="0"/>
+              <a:rPr lang="en-US"/>
               <a:t>Second level</a:t>
             </a:r>
           </a:p>
           <a:p>
             <a:pPr lvl="2"/>
             <a:r>
-              <a:rPr lang="en-US" smtClean="0"/>
+              <a:rPr lang="en-US"/>
               <a:t>Third level</a:t>
             </a:r>
           </a:p>
           <a:p>
             <a:pPr lvl="3"/>
             <a:r>
-              <a:rPr lang="en-US" smtClean="0"/>
+              <a:rPr lang="en-US"/>
               <a:t>Fourth level</a:t>
             </a:r>
           </a:p>
           <a:p>
             <a:pPr lvl="4"/>
             <a:r>
-              <a:rPr lang="en-US" smtClean="0"/>
+              <a:rPr lang="en-US"/>
               <a:t>Fifth level</a:t>
             </a:r>
-            <a:endParaRPr lang="en-US"/>
           </a:p>
         </p:txBody>
       </p:sp>
@@ -6345,38 +6458,37 @@
           <a:p>
             <a:pPr lvl="0"/>
             <a:r>
-              <a:rPr lang="en-US" smtClean="0"/>
+              <a:rPr lang="en-US"/>
               <a:t>Click to edit Master text styles</a:t>
             </a:r>
           </a:p>
           <a:p>
             <a:pPr lvl="1"/>
             <a:r>
-              <a:rPr lang="en-US" smtClean="0"/>
+              <a:rPr lang="en-US"/>
               <a:t>Second level</a:t>
             </a:r>
           </a:p>
           <a:p>
             <a:pPr lvl="2"/>
             <a:r>
-              <a:rPr lang="en-US" smtClean="0"/>
+              <a:rPr lang="en-US"/>
               <a:t>Third level</a:t>
             </a:r>
           </a:p>
           <a:p>
             <a:pPr lvl="3"/>
             <a:r>
-              <a:rPr lang="en-US" smtClean="0"/>
+              <a:rPr lang="en-US"/>
               <a:t>Fourth level</a:t>
             </a:r>
           </a:p>
           <a:p>
             <a:pPr lvl="4"/>
             <a:r>
-              <a:rPr lang="en-US" smtClean="0"/>
+              <a:rPr lang="en-US"/>
               <a:t>Fifth level</a:t>
             </a:r>
-            <a:endParaRPr lang="en-US"/>
           </a:p>
         </p:txBody>
       </p:sp>
@@ -6421,10 +6533,9 @@
           <a:lstStyle/>
           <a:p>
             <a:r>
-              <a:rPr lang="en-US" smtClean="0"/>
+              <a:rPr lang="en-US"/>
               <a:t>Click to edit Master title style</a:t>
             </a:r>
-            <a:endParaRPr lang="en-US"/>
           </a:p>
         </p:txBody>
       </p:sp>
@@ -6556,10 +6667,9 @@
           </a:lstStyle>
           <a:p>
             <a:r>
-              <a:rPr lang="en-US" smtClean="0"/>
+              <a:rPr lang="en-US"/>
               <a:t>Click to edit Master title style</a:t>
             </a:r>
-            <a:endParaRPr lang="en-US"/>
           </a:p>
         </p:txBody>
       </p:sp>
@@ -6676,7 +6786,7 @@
           <a:p>
             <a:pPr lvl="0"/>
             <a:r>
-              <a:rPr lang="en-US" smtClean="0"/>
+              <a:rPr lang="en-US"/>
               <a:t>Click to edit Master text styles</a:t>
             </a:r>
           </a:p>
@@ -6699,7 +6809,7 @@
           <a:p>
             <a:fld id="{339EFAEE-716A-4A3B-BEA5-CE1340F815D6}" type="datetimeFigureOut">
               <a:rPr lang="en-US" smtClean="0"/>
-              <a:t>10/1/2016</a:t>
+              <a:t>8/4/2018</a:t>
             </a:fld>
             <a:endParaRPr lang="en-US"/>
           </a:p>
@@ -6788,10 +6898,9 @@
           <a:lstStyle/>
           <a:p>
             <a:r>
-              <a:rPr lang="en-US" smtClean="0"/>
+              <a:rPr lang="en-US"/>
               <a:t>Click to edit Master title style</a:t>
             </a:r>
-            <a:endParaRPr lang="en-US"/>
           </a:p>
         </p:txBody>
       </p:sp>
@@ -6845,38 +6954,37 @@
           <a:p>
             <a:pPr lvl="0"/>
             <a:r>
-              <a:rPr lang="en-US" smtClean="0"/>
+              <a:rPr lang="en-US"/>
               <a:t>Click to edit Master text styles</a:t>
             </a:r>
           </a:p>
           <a:p>
             <a:pPr lvl="1"/>
             <a:r>
-              <a:rPr lang="en-US" smtClean="0"/>
+              <a:rPr lang="en-US"/>
               <a:t>Second level</a:t>
             </a:r>
           </a:p>
           <a:p>
             <a:pPr lvl="2"/>
             <a:r>
-              <a:rPr lang="en-US" smtClean="0"/>
+              <a:rPr lang="en-US"/>
               <a:t>Third level</a:t>
             </a:r>
           </a:p>
           <a:p>
             <a:pPr lvl="3"/>
             <a:r>
-              <a:rPr lang="en-US" smtClean="0"/>
+              <a:rPr lang="en-US"/>
               <a:t>Fourth level</a:t>
             </a:r>
           </a:p>
           <a:p>
             <a:pPr lvl="4"/>
             <a:r>
-              <a:rPr lang="en-US" smtClean="0"/>
+              <a:rPr lang="en-US"/>
               <a:t>Fifth level</a:t>
             </a:r>
-            <a:endParaRPr lang="en-US"/>
           </a:p>
         </p:txBody>
       </p:sp>
@@ -6930,38 +7038,37 @@
           <a:p>
             <a:pPr lvl="0"/>
             <a:r>
-              <a:rPr lang="en-US" smtClean="0"/>
+              <a:rPr lang="en-US"/>
               <a:t>Click to edit Master text styles</a:t>
             </a:r>
           </a:p>
           <a:p>
             <a:pPr lvl="1"/>
             <a:r>
-              <a:rPr lang="en-US" smtClean="0"/>
+              <a:rPr lang="en-US"/>
               <a:t>Second level</a:t>
             </a:r>
           </a:p>
           <a:p>
             <a:pPr lvl="2"/>
             <a:r>
-              <a:rPr lang="en-US" smtClean="0"/>
+              <a:rPr lang="en-US"/>
               <a:t>Third level</a:t>
             </a:r>
           </a:p>
           <a:p>
             <a:pPr lvl="3"/>
             <a:r>
-              <a:rPr lang="en-US" smtClean="0"/>
+              <a:rPr lang="en-US"/>
               <a:t>Fourth level</a:t>
             </a:r>
           </a:p>
           <a:p>
             <a:pPr lvl="4"/>
             <a:r>
-              <a:rPr lang="en-US" smtClean="0"/>
+              <a:rPr lang="en-US"/>
               <a:t>Fifth level</a:t>
             </a:r>
-            <a:endParaRPr lang="en-US"/>
           </a:p>
         </p:txBody>
       </p:sp>
@@ -6982,7 +7089,7 @@
           <a:p>
             <a:fld id="{339EFAEE-716A-4A3B-BEA5-CE1340F815D6}" type="datetimeFigureOut">
               <a:rPr lang="en-US" smtClean="0"/>
-              <a:t>10/1/2016</a:t>
+              <a:t>8/4/2018</a:t>
             </a:fld>
             <a:endParaRPr lang="en-US"/>
           </a:p>
@@ -7075,10 +7182,9 @@
           </a:lstStyle>
           <a:p>
             <a:r>
-              <a:rPr lang="en-US" smtClean="0"/>
+              <a:rPr lang="en-US"/>
               <a:t>Click to edit Master title style</a:t>
             </a:r>
-            <a:endParaRPr lang="en-US"/>
           </a:p>
         </p:txBody>
       </p:sp>
@@ -7141,7 +7247,7 @@
           <a:p>
             <a:pPr lvl="0"/>
             <a:r>
-              <a:rPr lang="en-US" smtClean="0"/>
+              <a:rPr lang="en-US"/>
               <a:t>Click to edit Master text styles</a:t>
             </a:r>
           </a:p>
@@ -7197,38 +7303,37 @@
           <a:p>
             <a:pPr lvl="0"/>
             <a:r>
-              <a:rPr lang="en-US" smtClean="0"/>
+              <a:rPr lang="en-US"/>
               <a:t>Click to edit Master text styles</a:t>
             </a:r>
           </a:p>
           <a:p>
             <a:pPr lvl="1"/>
             <a:r>
-              <a:rPr lang="en-US" smtClean="0"/>
+              <a:rPr lang="en-US"/>
               <a:t>Second level</a:t>
             </a:r>
           </a:p>
           <a:p>
             <a:pPr lvl="2"/>
             <a:r>
-              <a:rPr lang="en-US" smtClean="0"/>
+              <a:rPr lang="en-US"/>
               <a:t>Third level</a:t>
             </a:r>
           </a:p>
           <a:p>
             <a:pPr lvl="3"/>
             <a:r>
-              <a:rPr lang="en-US" smtClean="0"/>
+              <a:rPr lang="en-US"/>
               <a:t>Fourth level</a:t>
             </a:r>
           </a:p>
           <a:p>
             <a:pPr lvl="4"/>
             <a:r>
-              <a:rPr lang="en-US" smtClean="0"/>
+              <a:rPr lang="en-US"/>
               <a:t>Fifth level</a:t>
             </a:r>
-            <a:endParaRPr lang="en-US"/>
           </a:p>
         </p:txBody>
       </p:sp>
@@ -7291,7 +7396,7 @@
           <a:p>
             <a:pPr lvl="0"/>
             <a:r>
-              <a:rPr lang="en-US" smtClean="0"/>
+              <a:rPr lang="en-US"/>
               <a:t>Click to edit Master text styles</a:t>
             </a:r>
           </a:p>
@@ -7347,38 +7452,37 @@
           <a:p>
             <a:pPr lvl="0"/>
             <a:r>
-              <a:rPr lang="en-US" smtClean="0"/>
+              <a:rPr lang="en-US"/>
               <a:t>Click to edit Master text styles</a:t>
             </a:r>
           </a:p>
           <a:p>
             <a:pPr lvl="1"/>
             <a:r>
-              <a:rPr lang="en-US" smtClean="0"/>
+              <a:rPr lang="en-US"/>
               <a:t>Second level</a:t>
             </a:r>
           </a:p>
           <a:p>
             <a:pPr lvl="2"/>
             <a:r>
-              <a:rPr lang="en-US" smtClean="0"/>
+              <a:rPr lang="en-US"/>
               <a:t>Third level</a:t>
             </a:r>
           </a:p>
           <a:p>
             <a:pPr lvl="3"/>
             <a:r>
-              <a:rPr lang="en-US" smtClean="0"/>
+              <a:rPr lang="en-US"/>
               <a:t>Fourth level</a:t>
             </a:r>
           </a:p>
           <a:p>
             <a:pPr lvl="4"/>
             <a:r>
-              <a:rPr lang="en-US" smtClean="0"/>
+              <a:rPr lang="en-US"/>
               <a:t>Fifth level</a:t>
             </a:r>
-            <a:endParaRPr lang="en-US"/>
           </a:p>
         </p:txBody>
       </p:sp>
@@ -7399,7 +7503,7 @@
           <a:p>
             <a:fld id="{339EFAEE-716A-4A3B-BEA5-CE1340F815D6}" type="datetimeFigureOut">
               <a:rPr lang="en-US" smtClean="0"/>
-              <a:t>10/1/2016</a:t>
+              <a:t>8/4/2018</a:t>
             </a:fld>
             <a:endParaRPr lang="en-US"/>
           </a:p>
@@ -7488,10 +7592,9 @@
           <a:lstStyle/>
           <a:p>
             <a:r>
-              <a:rPr lang="en-US" smtClean="0"/>
+              <a:rPr lang="en-US"/>
               <a:t>Click to edit Master title style</a:t>
             </a:r>
-            <a:endParaRPr lang="en-US"/>
           </a:p>
         </p:txBody>
       </p:sp>
@@ -7512,7 +7615,7 @@
           <a:p>
             <a:fld id="{339EFAEE-716A-4A3B-BEA5-CE1340F815D6}" type="datetimeFigureOut">
               <a:rPr lang="en-US" smtClean="0"/>
-              <a:t>10/1/2016</a:t>
+              <a:t>8/4/2018</a:t>
             </a:fld>
             <a:endParaRPr lang="en-US"/>
           </a:p>
@@ -7602,7 +7705,7 @@
           <a:p>
             <a:fld id="{339EFAEE-716A-4A3B-BEA5-CE1340F815D6}" type="datetimeFigureOut">
               <a:rPr lang="en-US" smtClean="0"/>
-              <a:t>10/1/2016</a:t>
+              <a:t>8/4/2018</a:t>
             </a:fld>
             <a:endParaRPr lang="en-US"/>
           </a:p>
@@ -7700,10 +7803,9 @@
           </a:lstStyle>
           <a:p>
             <a:r>
-              <a:rPr lang="en-US" smtClean="0"/>
+              <a:rPr lang="en-US"/>
               <a:t>Click to edit Master title style</a:t>
             </a:r>
-            <a:endParaRPr lang="en-US"/>
           </a:p>
         </p:txBody>
       </p:sp>
@@ -7757,38 +7859,37 @@
           <a:p>
             <a:pPr lvl="0"/>
             <a:r>
-              <a:rPr lang="en-US" smtClean="0"/>
+              <a:rPr lang="en-US"/>
               <a:t>Click to edit Master text styles</a:t>
             </a:r>
           </a:p>
           <a:p>
             <a:pPr lvl="1"/>
             <a:r>
-              <a:rPr lang="en-US" smtClean="0"/>
+              <a:rPr lang="en-US"/>
               <a:t>Second level</a:t>
             </a:r>
           </a:p>
           <a:p>
             <a:pPr lvl="2"/>
             <a:r>
-              <a:rPr lang="en-US" smtClean="0"/>
+              <a:rPr lang="en-US"/>
               <a:t>Third level</a:t>
             </a:r>
           </a:p>
           <a:p>
             <a:pPr lvl="3"/>
             <a:r>
-              <a:rPr lang="en-US" smtClean="0"/>
+              <a:rPr lang="en-US"/>
               <a:t>Fourth level</a:t>
             </a:r>
           </a:p>
           <a:p>
             <a:pPr lvl="4"/>
             <a:r>
-              <a:rPr lang="en-US" smtClean="0"/>
+              <a:rPr lang="en-US"/>
               <a:t>Fifth level</a:t>
             </a:r>
-            <a:endParaRPr lang="en-US"/>
           </a:p>
         </p:txBody>
       </p:sp>
@@ -7851,7 +7952,7 @@
           <a:p>
             <a:pPr lvl="0"/>
             <a:r>
-              <a:rPr lang="en-US" smtClean="0"/>
+              <a:rPr lang="en-US"/>
               <a:t>Click to edit Master text styles</a:t>
             </a:r>
           </a:p>
@@ -7874,7 +7975,7 @@
           <a:p>
             <a:fld id="{339EFAEE-716A-4A3B-BEA5-CE1340F815D6}" type="datetimeFigureOut">
               <a:rPr lang="en-US" smtClean="0"/>
-              <a:t>10/1/2016</a:t>
+              <a:t>8/4/2018</a:t>
             </a:fld>
             <a:endParaRPr lang="en-US"/>
           </a:p>
@@ -7972,10 +8073,9 @@
           </a:lstStyle>
           <a:p>
             <a:r>
-              <a:rPr lang="en-US" smtClean="0"/>
+              <a:rPr lang="en-US"/>
               <a:t>Click to edit Master title style</a:t>
             </a:r>
-            <a:endParaRPr lang="en-US"/>
           </a:p>
         </p:txBody>
       </p:sp>
@@ -8099,7 +8199,7 @@
           <a:p>
             <a:pPr lvl="0"/>
             <a:r>
-              <a:rPr lang="en-US" smtClean="0"/>
+              <a:rPr lang="en-US"/>
               <a:t>Click to edit Master text styles</a:t>
             </a:r>
           </a:p>
@@ -8122,7 +8222,7 @@
           <a:p>
             <a:fld id="{339EFAEE-716A-4A3B-BEA5-CE1340F815D6}" type="datetimeFigureOut">
               <a:rPr lang="en-US" smtClean="0"/>
-              <a:t>10/1/2016</a:t>
+              <a:t>8/4/2018</a:t>
             </a:fld>
             <a:endParaRPr lang="en-US"/>
           </a:p>
@@ -8226,10 +8326,9 @@
           <a:lstStyle/>
           <a:p>
             <a:r>
-              <a:rPr lang="en-US" smtClean="0"/>
+              <a:rPr lang="en-US"/>
               <a:t>Click to edit Master title style</a:t>
             </a:r>
-            <a:endParaRPr lang="en-US"/>
           </a:p>
         </p:txBody>
       </p:sp>
@@ -8260,38 +8359,37 @@
           <a:p>
             <a:pPr lvl="0"/>
             <a:r>
-              <a:rPr lang="en-US" smtClean="0"/>
+              <a:rPr lang="en-US"/>
               <a:t>Click to edit Master text styles</a:t>
             </a:r>
           </a:p>
           <a:p>
             <a:pPr lvl="1"/>
             <a:r>
-              <a:rPr lang="en-US" smtClean="0"/>
+              <a:rPr lang="en-US"/>
               <a:t>Second level</a:t>
             </a:r>
           </a:p>
           <a:p>
             <a:pPr lvl="2"/>
             <a:r>
-              <a:rPr lang="en-US" smtClean="0"/>
+              <a:rPr lang="en-US"/>
               <a:t>Third level</a:t>
             </a:r>
           </a:p>
           <a:p>
             <a:pPr lvl="3"/>
             <a:r>
-              <a:rPr lang="en-US" smtClean="0"/>
+              <a:rPr lang="en-US"/>
               <a:t>Fourth level</a:t>
             </a:r>
           </a:p>
           <a:p>
             <a:pPr lvl="4"/>
             <a:r>
-              <a:rPr lang="en-US" smtClean="0"/>
+              <a:rPr lang="en-US"/>
               <a:t>Fifth level</a:t>
             </a:r>
-            <a:endParaRPr lang="en-US"/>
           </a:p>
         </p:txBody>
       </p:sp>
@@ -8330,7 +8428,7 @@
           <a:p>
             <a:fld id="{339EFAEE-716A-4A3B-BEA5-CE1340F815D6}" type="datetimeFigureOut">
               <a:rPr lang="en-US" smtClean="0"/>
-              <a:t>10/1/2016</a:t>
+              <a:t>8/4/2018</a:t>
             </a:fld>
             <a:endParaRPr lang="en-US"/>
           </a:p>
@@ -8732,35 +8830,35 @@
           <a:p>
             <a:pPr lvl="0"/>
             <a:r>
-              <a:rPr lang="en-US" smtClean="0"/>
+              <a:rPr lang="en-US"/>
               <a:t>Click to edit Master text styles</a:t>
             </a:r>
           </a:p>
           <a:p>
             <a:pPr lvl="1"/>
             <a:r>
-              <a:rPr lang="en-US" smtClean="0"/>
+              <a:rPr lang="en-US"/>
               <a:t>Second level</a:t>
             </a:r>
           </a:p>
           <a:p>
             <a:pPr lvl="2"/>
             <a:r>
-              <a:rPr lang="en-US" smtClean="0"/>
+              <a:rPr lang="en-US"/>
               <a:t>Third level</a:t>
             </a:r>
           </a:p>
           <a:p>
             <a:pPr lvl="3"/>
             <a:r>
-              <a:rPr lang="en-US" smtClean="0"/>
+              <a:rPr lang="en-US"/>
               <a:t>Fourth level</a:t>
             </a:r>
           </a:p>
           <a:p>
             <a:pPr lvl="4"/>
             <a:r>
-              <a:rPr lang="en-US" smtClean="0"/>
+              <a:rPr lang="en-US"/>
               <a:t>Fifth level</a:t>
             </a:r>
             <a:endParaRPr lang="en-GB" dirty="0"/>
@@ -8880,7 +8978,7 @@
           <a:lstStyle/>
           <a:p>
             <a:r>
-              <a:rPr lang="en-US" smtClean="0"/>
+              <a:rPr lang="en-US"/>
               <a:t>Click to edit Master title style</a:t>
             </a:r>
             <a:endParaRPr lang="en-GB" dirty="0"/>
@@ -8899,7 +8997,7 @@
           <a:blip r:embed="rId19" cstate="print">
             <a:extLst>
               <a:ext uri="{28A0092B-C50C-407E-A947-70E740481C1C}">
-                <a14:useLocalDpi xmlns="" xmlns:a14="http://schemas.microsoft.com/office/drawing/2010/main" val="0"/>
+                <a14:useLocalDpi xmlns:a14="http://schemas.microsoft.com/office/drawing/2010/main" val="0"/>
               </a:ext>
             </a:extLst>
           </a:blip>
@@ -9025,7 +9123,7 @@
     </p:spTree>
     <p:extLst>
       <p:ext uri="{BB962C8B-B14F-4D97-AF65-F5344CB8AC3E}">
-        <p14:creationId xmlns="" xmlns:p14="http://schemas.microsoft.com/office/powerpoint/2010/main" val="4260756284"/>
+        <p14:creationId xmlns:p14="http://schemas.microsoft.com/office/powerpoint/2010/main" val="4260756284"/>
       </p:ext>
     </p:extLst>
   </p:cSld>
@@ -9049,13 +9147,6 @@
     <p:sldLayoutId id="2147483676" r:id="rId16"/>
     <p:sldLayoutId id="2147483677" r:id="rId17"/>
   </p:sldLayoutIdLst>
-  <p:timing>
-    <p:tnLst>
-      <p:par>
-        <p:cTn id="1" dur="indefinite" restart="never" nodeType="tmRoot"/>
-      </p:par>
-    </p:tnLst>
-  </p:timing>
   <p:hf hdr="0" ftr="0" dt="0"/>
   <p:txStyles>
     <p:titleStyle>
@@ -9376,10 +9467,9 @@
           <a:lstStyle/>
           <a:p>
             <a:r>
-              <a:rPr lang="en-US" dirty="0" smtClean="0"/>
+              <a:rPr lang="en-US" dirty="0"/>
               <a:t>Backup and References</a:t>
             </a:r>
-            <a:endParaRPr lang="en-US" dirty="0"/>
           </a:p>
         </p:txBody>
       </p:sp>
@@ -9402,7 +9492,7 @@
               <a:defRPr/>
             </a:pPr>
             <a:r>
-              <a:rPr lang="en-US" sz="2600" dirty="0" smtClean="0"/>
+              <a:rPr lang="en-US" sz="2600" dirty="0"/>
               <a:t>Scaffold Generation Methods: </a:t>
             </a:r>
           </a:p>
@@ -9411,17 +9501,17 @@
               <a:defRPr/>
             </a:pPr>
             <a:r>
-              <a:rPr lang="en-US" sz="2200" dirty="0" smtClean="0"/>
+              <a:rPr lang="en-US" sz="2200" dirty="0"/>
               <a:t>NCATS R-group analysis (</a:t>
             </a:r>
             <a:r>
-              <a:rPr lang="en-US" sz="2200" dirty="0" smtClean="0">
+              <a:rPr lang="en-US" sz="2200" dirty="0">
                 <a:hlinkClick r:id="rId2"/>
               </a:rPr>
               <a:t>http://tripod.nih.gov/?p=46</a:t>
             </a:r>
             <a:r>
-              <a:rPr lang="en-US" sz="2200" dirty="0" smtClean="0"/>
+              <a:rPr lang="en-US" sz="2200" dirty="0"/>
               <a:t> )</a:t>
             </a:r>
           </a:p>
@@ -9430,7 +9520,7 @@
               <a:defRPr/>
             </a:pPr>
             <a:r>
-              <a:rPr lang="en-US" sz="2200" dirty="0" smtClean="0"/>
+              <a:rPr lang="en-US" sz="2200" dirty="0"/>
               <a:t>Frameworks (Data-Driven Clustering, GSK/ChemAxon)</a:t>
             </a:r>
           </a:p>
@@ -9439,17 +9529,17 @@
               <a:defRPr/>
             </a:pPr>
             <a:r>
-              <a:rPr lang="en-US" sz="2200" dirty="0" smtClean="0"/>
+              <a:rPr lang="en-US" sz="2200" dirty="0"/>
               <a:t>Scaffold Network Generator (</a:t>
             </a:r>
             <a:r>
-              <a:rPr lang="en-US" sz="2200" dirty="0" smtClean="0">
+              <a:rPr lang="en-US" sz="2200" dirty="0">
                 <a:hlinkClick r:id="rId3"/>
               </a:rPr>
               <a:t>http://swami.wustl.edu/sng</a:t>
             </a:r>
             <a:r>
-              <a:rPr lang="en-US" sz="2200" dirty="0" smtClean="0"/>
+              <a:rPr lang="en-US" sz="2200" dirty="0"/>
               <a:t>) </a:t>
             </a:r>
           </a:p>
@@ -9458,28 +9548,28 @@
               <a:defRPr/>
             </a:pPr>
             <a:r>
-              <a:rPr lang="en-US" sz="2200" dirty="0" smtClean="0"/>
+              <a:rPr lang="en-US" sz="2200" dirty="0"/>
               <a:t>Agglomerative Clustering (Complete Linkage, GSK/</a:t>
             </a:r>
             <a:r>
-              <a:rPr lang="en-US" sz="2200" dirty="0" err="1" smtClean="0"/>
+              <a:rPr lang="en-US" sz="2200" dirty="0" err="1"/>
               <a:t>ChemAxon</a:t>
             </a:r>
             <a:r>
-              <a:rPr lang="en-US" sz="2200" dirty="0" smtClean="0"/>
+              <a:rPr lang="en-US" sz="2200" dirty="0"/>
               <a:t>)</a:t>
             </a:r>
             <a:br>
-              <a:rPr lang="en-US" sz="2200" dirty="0" smtClean="0"/>
+              <a:rPr lang="en-US" sz="2200" dirty="0"/>
             </a:br>
-            <a:endParaRPr lang="en-US" sz="2200" dirty="0" smtClean="0"/>
+            <a:endParaRPr lang="en-US" sz="2200" dirty="0"/>
           </a:p>
           <a:p>
             <a:pPr>
               <a:defRPr/>
             </a:pPr>
             <a:r>
-              <a:rPr lang="en-US" sz="2400" dirty="0" smtClean="0"/>
+              <a:rPr lang="en-US" sz="2400" dirty="0"/>
               <a:t>NCATS Scaffold Prioritization work:</a:t>
             </a:r>
           </a:p>
@@ -9490,7 +9580,7 @@
               </a:buClr>
             </a:pPr>
             <a:r>
-              <a:rPr lang="en-US" sz="1200" dirty="0" smtClean="0">
+              <a:rPr lang="en-US" sz="1200" dirty="0">
                 <a:hlinkClick r:id="rId4"/>
               </a:rPr>
               <a:t>http://www.slideshare.net/rguha/characterization-of-chemical-libraries-using-scaffolds-and-network-models </a:t>
@@ -9503,12 +9593,12 @@
               </a:buClr>
             </a:pPr>
             <a:r>
-              <a:rPr lang="en-US" sz="1200" dirty="0" smtClean="0">
+              <a:rPr lang="en-US" sz="1200" dirty="0">
                 <a:hlinkClick r:id="rId4"/>
               </a:rPr>
               <a:t>http://www.slideshare.net/rguha/prioritizing-scaffolds-for-hit-selection-in-high-throughput-screening-programs-2868540</a:t>
             </a:r>
-            <a:endParaRPr lang="en-US" sz="1200" dirty="0" smtClean="0"/>
+            <a:endParaRPr lang="en-US" sz="1200" dirty="0"/>
           </a:p>
           <a:p>
             <a:pPr marL="439613" lvl="1" indent="-171450">
@@ -9517,7 +9607,7 @@
               </a:buClr>
             </a:pPr>
             <a:r>
-              <a:rPr lang="en-US" sz="1200" dirty="0" smtClean="0"/>
+              <a:rPr lang="en-US" sz="1200" dirty="0"/>
               <a:t>They have been developing a workflow for doing what we need since ~2010 (see second presentation)</a:t>
             </a:r>
           </a:p>
@@ -9525,7 +9615,7 @@
             <a:pPr lvl="1">
               <a:defRPr/>
             </a:pPr>
-            <a:endParaRPr lang="en-US" sz="2200" dirty="0" smtClean="0"/>
+            <a:endParaRPr lang="en-US" sz="2200" dirty="0"/>
           </a:p>
           <a:p>
             <a:endParaRPr lang="en-US" dirty="0"/>
@@ -9742,11 +9832,6 @@
               </a:rPr>
               <a:t> </a:t>
             </a:r>
-            <a:endParaRPr lang="en-US" sz="1000" dirty="0">
-              <a:solidFill>
-                <a:srgbClr val="635A54"/>
-              </a:solidFill>
-            </a:endParaRPr>
           </a:p>
         </p:txBody>
       </p:sp>
@@ -9840,13 +9925,6 @@
     <a:masterClrMapping/>
   </p:clrMapOvr>
   <p:transition/>
-  <p:timing>
-    <p:tnLst>
-      <p:par>
-        <p:cTn id="1" dur="indefinite" restart="never" nodeType="tmRoot"/>
-      </p:par>
-    </p:tnLst>
-  </p:timing>
 </p:sld>
 </file>
 
@@ -9883,18 +9961,17 @@
           <a:lstStyle/>
           <a:p>
             <a:r>
-              <a:rPr lang="en-US" dirty="0" smtClean="0"/>
+              <a:rPr lang="en-US" dirty="0"/>
               <a:t>Comparing Two Overlapping </a:t>
             </a:r>
             <a:r>
-              <a:rPr lang="en-US" dirty="0" err="1" smtClean="0"/>
+              <a:rPr lang="en-US" dirty="0" err="1"/>
               <a:t>Ontologies</a:t>
             </a:r>
             <a:r>
-              <a:rPr lang="en-US" dirty="0" smtClean="0"/>
+              <a:rPr lang="en-US" dirty="0"/>
               <a:t>: Method</a:t>
             </a:r>
-            <a:endParaRPr lang="en-US" dirty="0"/>
           </a:p>
         </p:txBody>
       </p:sp>
@@ -9919,153 +9996,153 @@
           <a:lstStyle/>
           <a:p>
             <a:r>
-              <a:rPr lang="en-US" sz="2000" dirty="0" smtClean="0"/>
+              <a:rPr lang="en-US" sz="2000" dirty="0"/>
               <a:t>Methods: A: Data-Driven Frameworks; B: R-Group Decomposition</a:t>
             </a:r>
           </a:p>
           <a:p>
             <a:r>
-              <a:rPr lang="en-US" sz="2000" dirty="0" smtClean="0"/>
+              <a:rPr lang="en-US" sz="2000" dirty="0"/>
               <a:t>Statistical measures calculated for each compound, X:</a:t>
             </a:r>
           </a:p>
           <a:p>
             <a:pPr lvl="1"/>
             <a:r>
-              <a:rPr lang="en-US" sz="1800" b="1" dirty="0" err="1" smtClean="0"/>
+              <a:rPr lang="en-US" sz="1800" b="1" dirty="0" err="1"/>
               <a:t>Frag</a:t>
             </a:r>
             <a:r>
-              <a:rPr lang="en-US" sz="1800" b="1" baseline="-25000" dirty="0" err="1" smtClean="0"/>
+              <a:rPr lang="en-US" sz="1800" b="1" baseline="-25000" dirty="0" err="1"/>
               <a:t>A</a:t>
             </a:r>
             <a:r>
-              <a:rPr lang="en-US" sz="1800" b="1" dirty="0" smtClean="0"/>
+              <a:rPr lang="en-US" sz="1800" b="1" dirty="0"/>
               <a:t>, </a:t>
             </a:r>
             <a:r>
-              <a:rPr lang="en-US" sz="1800" b="1" dirty="0" err="1" smtClean="0"/>
+              <a:rPr lang="en-US" sz="1800" b="1" dirty="0" err="1"/>
               <a:t>Frag</a:t>
             </a:r>
             <a:r>
-              <a:rPr lang="en-US" sz="1800" b="1" baseline="-25000" dirty="0" err="1" smtClean="0"/>
+              <a:rPr lang="en-US" sz="1800" b="1" baseline="-25000" dirty="0" err="1"/>
               <a:t>B</a:t>
             </a:r>
             <a:r>
-              <a:rPr lang="en-US" sz="1800" b="1" dirty="0" smtClean="0"/>
+              <a:rPr lang="en-US" sz="1800" b="1" dirty="0"/>
               <a:t>:</a:t>
             </a:r>
             <a:r>
-              <a:rPr lang="en-US" sz="1800" dirty="0" smtClean="0"/>
+              <a:rPr lang="en-US" sz="1800" dirty="0"/>
               <a:t> # fragments from A or B that X shares with other compounds</a:t>
             </a:r>
           </a:p>
           <a:p>
             <a:pPr lvl="1"/>
             <a:r>
-              <a:rPr lang="en-US" sz="1800" b="1" dirty="0" smtClean="0"/>
+              <a:rPr lang="en-US" sz="1800" b="1" dirty="0"/>
               <a:t>C</a:t>
             </a:r>
             <a:r>
-              <a:rPr lang="en-US" sz="1800" b="1" baseline="-25000" dirty="0" smtClean="0"/>
+              <a:rPr lang="en-US" sz="1800" b="1" baseline="-25000" dirty="0"/>
               <a:t>A</a:t>
             </a:r>
             <a:r>
-              <a:rPr lang="en-US" sz="1800" b="1" dirty="0" smtClean="0"/>
+              <a:rPr lang="en-US" sz="1800" b="1" dirty="0"/>
               <a:t>, C</a:t>
             </a:r>
             <a:r>
-              <a:rPr lang="en-US" sz="1800" b="1" baseline="-25000" dirty="0" smtClean="0"/>
+              <a:rPr lang="en-US" sz="1800" b="1" baseline="-25000" dirty="0"/>
               <a:t>B</a:t>
             </a:r>
             <a:r>
-              <a:rPr lang="en-US" sz="1800" b="1" dirty="0" smtClean="0"/>
+              <a:rPr lang="en-US" sz="1800" b="1" dirty="0"/>
               <a:t>:</a:t>
             </a:r>
             <a:r>
-              <a:rPr lang="en-US" sz="1800" dirty="0" smtClean="0"/>
+              <a:rPr lang="en-US" sz="1800" dirty="0"/>
               <a:t> Set of compounds linked to X</a:t>
             </a:r>
             <a:r>
-              <a:rPr lang="en-US" sz="1800" baseline="-25000" dirty="0" smtClean="0"/>
+              <a:rPr lang="en-US" sz="1800" baseline="-25000" dirty="0"/>
               <a:t>  </a:t>
             </a:r>
             <a:r>
-              <a:rPr lang="en-US" sz="1800" dirty="0" smtClean="0"/>
+              <a:rPr lang="en-US" sz="1800" dirty="0"/>
               <a:t>by these shared fragments</a:t>
             </a:r>
           </a:p>
           <a:p>
             <a:pPr lvl="1"/>
             <a:r>
-              <a:rPr lang="en-US" sz="1800" b="1" dirty="0" smtClean="0"/>
+              <a:rPr lang="en-US" sz="1800" b="1" dirty="0"/>
               <a:t>Fragment Efficiency:</a:t>
             </a:r>
             <a:r>
-              <a:rPr lang="en-US" sz="1800" dirty="0" smtClean="0"/>
+              <a:rPr lang="en-US" sz="1800" dirty="0"/>
               <a:t> # compounds linked </a:t>
             </a:r>
             <a:r>
-              <a:rPr lang="en-US" sz="1800" i="1" dirty="0" smtClean="0"/>
+              <a:rPr lang="en-US" sz="1800" i="1" dirty="0"/>
               <a:t>per fragment</a:t>
             </a:r>
             <a:r>
-              <a:rPr lang="en-US" sz="1800" dirty="0" smtClean="0"/>
+              <a:rPr lang="en-US" sz="1800" dirty="0"/>
               <a:t>.</a:t>
             </a:r>
             <a:br>
-              <a:rPr lang="en-US" sz="1800" dirty="0" smtClean="0"/>
+              <a:rPr lang="en-US" sz="1800" dirty="0"/>
             </a:br>
             <a:r>
-              <a:rPr lang="en-US" sz="1800" b="1" dirty="0" smtClean="0">
+              <a:rPr lang="en-US" sz="1800" b="1" dirty="0">
                 <a:solidFill>
                   <a:srgbClr val="0070C0"/>
                 </a:solidFill>
               </a:rPr>
               <a:t>Question: Which method is less wasteful in linking compounds?</a:t>
             </a:r>
-            <a:endParaRPr lang="en-US" sz="1800" dirty="0" smtClean="0"/>
+            <a:endParaRPr lang="en-US" sz="1800" dirty="0"/>
           </a:p>
           <a:p>
             <a:pPr lvl="1"/>
             <a:r>
-              <a:rPr lang="en-US" sz="1800" b="1" dirty="0" smtClean="0"/>
+              <a:rPr lang="en-US" sz="1800" b="1" dirty="0"/>
               <a:t>Common Proportion:</a:t>
             </a:r>
             <a:r>
-              <a:rPr lang="en-US" sz="1800" dirty="0" smtClean="0"/>
+              <a:rPr lang="en-US" sz="1800" dirty="0"/>
               <a:t> Ratio of size of Intersection(C</a:t>
             </a:r>
             <a:r>
-              <a:rPr lang="en-US" sz="1800" baseline="-25000" dirty="0" smtClean="0"/>
+              <a:rPr lang="en-US" sz="1800" baseline="-25000" dirty="0"/>
               <a:t>A</a:t>
             </a:r>
             <a:r>
-              <a:rPr lang="en-US" sz="1800" dirty="0" smtClean="0"/>
+              <a:rPr lang="en-US" sz="1800" dirty="0"/>
               <a:t>, C</a:t>
             </a:r>
             <a:r>
-              <a:rPr lang="en-US" sz="1800" baseline="-25000" dirty="0" smtClean="0"/>
+              <a:rPr lang="en-US" sz="1800" baseline="-25000" dirty="0"/>
               <a:t>B</a:t>
             </a:r>
             <a:r>
-              <a:rPr lang="en-US" sz="1800" dirty="0" smtClean="0"/>
+              <a:rPr lang="en-US" sz="1800" dirty="0"/>
               <a:t>) to Union(C</a:t>
             </a:r>
             <a:r>
-              <a:rPr lang="en-US" sz="1800" baseline="-25000" dirty="0" smtClean="0"/>
+              <a:rPr lang="en-US" sz="1800" baseline="-25000" dirty="0"/>
               <a:t>A</a:t>
             </a:r>
             <a:r>
-              <a:rPr lang="en-US" sz="1800" dirty="0" smtClean="0"/>
+              <a:rPr lang="en-US" sz="1800" dirty="0"/>
               <a:t>, C</a:t>
             </a:r>
             <a:r>
-              <a:rPr lang="en-US" sz="1800" baseline="-25000" dirty="0" smtClean="0"/>
+              <a:rPr lang="en-US" sz="1800" baseline="-25000" dirty="0"/>
               <a:t>B</a:t>
             </a:r>
             <a:r>
-              <a:rPr lang="en-US" sz="1800" dirty="0" smtClean="0"/>
+              <a:rPr lang="en-US" sz="1800" dirty="0"/>
               <a:t>) </a:t>
             </a:r>
           </a:p>
@@ -10074,14 +10151,14 @@
               <a:buNone/>
             </a:pPr>
             <a:r>
-              <a:rPr lang="en-US" sz="1800" b="1" dirty="0" smtClean="0">
+              <a:rPr lang="en-US" sz="1800" b="1" dirty="0">
                 <a:solidFill>
                   <a:srgbClr val="0070C0"/>
                 </a:solidFill>
               </a:rPr>
               <a:t>Question: “How similar are methods A and B for this molecule” ?</a:t>
             </a:r>
-            <a:endParaRPr lang="en-US" sz="1600" b="1" dirty="0" smtClean="0">
+            <a:endParaRPr lang="en-US" sz="1600" b="1" dirty="0">
               <a:solidFill>
                 <a:srgbClr val="0070C0"/>
               </a:solidFill>
@@ -10090,46 +10167,46 @@
           <a:p>
             <a:pPr lvl="1"/>
             <a:r>
-              <a:rPr lang="en-US" sz="1800" b="1" dirty="0" smtClean="0"/>
+              <a:rPr lang="en-US" sz="1800" b="1" dirty="0"/>
               <a:t>Proportion of Information Unique to A or B:</a:t>
             </a:r>
             <a:r>
-              <a:rPr lang="en-US" sz="1800" dirty="0" smtClean="0"/>
+              <a:rPr lang="en-US" sz="1800" dirty="0"/>
               <a:t> PIU(A), PIU(B) </a:t>
             </a:r>
           </a:p>
           <a:p>
             <a:pPr lvl="2"/>
             <a:r>
-              <a:rPr lang="en-US" sz="1600" dirty="0" smtClean="0"/>
+              <a:rPr lang="en-US" sz="1600" dirty="0"/>
               <a:t>PI(A) = Ratio of size of C</a:t>
             </a:r>
             <a:r>
-              <a:rPr lang="en-US" sz="1600" baseline="-25000" dirty="0" smtClean="0"/>
+              <a:rPr lang="en-US" sz="1600" baseline="-25000" dirty="0"/>
               <a:t>A</a:t>
             </a:r>
             <a:r>
-              <a:rPr lang="en-US" sz="1600" dirty="0" smtClean="0"/>
+              <a:rPr lang="en-US" sz="1600" dirty="0"/>
               <a:t> to Union(C</a:t>
             </a:r>
             <a:r>
-              <a:rPr lang="en-US" sz="1600" baseline="-25000" dirty="0" smtClean="0"/>
+              <a:rPr lang="en-US" sz="1600" baseline="-25000" dirty="0"/>
               <a:t>A</a:t>
             </a:r>
             <a:r>
-              <a:rPr lang="en-US" sz="1600" dirty="0" smtClean="0"/>
+              <a:rPr lang="en-US" sz="1600" dirty="0"/>
               <a:t>,C</a:t>
             </a:r>
             <a:r>
-              <a:rPr lang="en-US" sz="1600" baseline="-25000" dirty="0" smtClean="0"/>
+              <a:rPr lang="en-US" sz="1600" baseline="-25000" dirty="0"/>
               <a:t>B</a:t>
             </a:r>
             <a:r>
-              <a:rPr lang="en-US" sz="1600" dirty="0" smtClean="0"/>
+              <a:rPr lang="en-US" sz="1600" dirty="0"/>
               <a:t>); </a:t>
             </a:r>
             <a:r>
-              <a:rPr lang="en-US" sz="1600" b="1" dirty="0" smtClean="0">
+              <a:rPr lang="en-US" sz="1600" b="1" dirty="0">
                 <a:solidFill>
                   <a:srgbClr val="0070C0"/>
                 </a:solidFill>
@@ -10137,14 +10214,14 @@
               <a:t>proportion obtainable </a:t>
             </a:r>
             <a:r>
-              <a:rPr lang="en-US" sz="1600" b="1" i="1" dirty="0" smtClean="0">
+              <a:rPr lang="en-US" sz="1600" b="1" i="1" dirty="0">
                 <a:solidFill>
                   <a:srgbClr val="0070C0"/>
                 </a:solidFill>
               </a:rPr>
               <a:t>from A alone</a:t>
             </a:r>
-            <a:endParaRPr lang="en-US" sz="1600" b="1" dirty="0" smtClean="0">
+            <a:endParaRPr lang="en-US" sz="1600" b="1" dirty="0">
               <a:solidFill>
                 <a:srgbClr val="0070C0"/>
               </a:solidFill>
@@ -10153,11 +10230,11 @@
           <a:p>
             <a:pPr lvl="2"/>
             <a:r>
-              <a:rPr lang="en-US" sz="1600" dirty="0" smtClean="0"/>
+              <a:rPr lang="en-US" sz="1600" dirty="0"/>
               <a:t>PIU(A) = 1-PI(B);                                         </a:t>
             </a:r>
             <a:r>
-              <a:rPr lang="en-US" sz="1600" b="1" dirty="0" smtClean="0">
+              <a:rPr lang="en-US" sz="1600" b="1" dirty="0">
                 <a:solidFill>
                   <a:srgbClr val="0070C0"/>
                 </a:solidFill>
@@ -10165,7 +10242,7 @@
               <a:t>proportion </a:t>
             </a:r>
             <a:r>
-              <a:rPr lang="en-US" sz="1600" b="1" i="1" dirty="0" smtClean="0">
+              <a:rPr lang="en-US" sz="1600" b="1" i="1" dirty="0">
                 <a:solidFill>
                   <a:srgbClr val="0070C0"/>
                 </a:solidFill>
@@ -10173,7 +10250,7 @@
               <a:t>unique</a:t>
             </a:r>
             <a:r>
-              <a:rPr lang="en-US" sz="1600" b="1" dirty="0" smtClean="0">
+              <a:rPr lang="en-US" sz="1600" b="1" dirty="0">
                 <a:solidFill>
                   <a:srgbClr val="0070C0"/>
                 </a:solidFill>
@@ -10181,44 +10258,43 @@
               <a:t> to A</a:t>
             </a:r>
             <a:r>
-              <a:rPr lang="en-US" sz="1600" b="1" dirty="0" smtClean="0"/>
+              <a:rPr lang="en-US" sz="1600" b="1" dirty="0"/>
               <a:t> </a:t>
             </a:r>
           </a:p>
           <a:p>
             <a:pPr lvl="1"/>
             <a:r>
-              <a:rPr lang="en-US" sz="1800" dirty="0" smtClean="0"/>
+              <a:rPr lang="en-US" sz="1800" dirty="0"/>
               <a:t>All these measures can be examined  in aggregate (average), </a:t>
             </a:r>
             <a:br>
-              <a:rPr lang="en-US" sz="1800" dirty="0" smtClean="0"/>
+              <a:rPr lang="en-US" sz="1800" dirty="0"/>
             </a:br>
             <a:r>
-              <a:rPr lang="en-US" sz="1800" dirty="0" smtClean="0"/>
+              <a:rPr lang="en-US" sz="1800" dirty="0"/>
               <a:t>5</a:t>
             </a:r>
             <a:r>
-              <a:rPr lang="en-US" sz="1800" baseline="30000" dirty="0" smtClean="0"/>
+              <a:rPr lang="en-US" sz="1800" baseline="30000" dirty="0"/>
               <a:t>th</a:t>
             </a:r>
             <a:r>
-              <a:rPr lang="en-US" sz="1800" dirty="0" smtClean="0"/>
+              <a:rPr lang="en-US" sz="1800" dirty="0"/>
               <a:t>/95</a:t>
             </a:r>
             <a:r>
-              <a:rPr lang="en-US" sz="1800" baseline="30000" dirty="0" smtClean="0"/>
+              <a:rPr lang="en-US" sz="1800" baseline="30000" dirty="0"/>
               <a:t>th</a:t>
             </a:r>
             <a:r>
-              <a:rPr lang="en-US" sz="1800" dirty="0" smtClean="0"/>
+              <a:rPr lang="en-US" sz="1800" dirty="0"/>
               <a:t> percentiles (outliers), or for individual compounds </a:t>
             </a:r>
             <a:r>
-              <a:rPr lang="en-US" sz="1800" b="1" dirty="0" smtClean="0"/>
+              <a:rPr lang="en-US" sz="1800" b="1" dirty="0"/>
               <a:t>   </a:t>
             </a:r>
-            <a:endParaRPr lang="en-US" sz="1800" b="1" dirty="0"/>
           </a:p>
         </p:txBody>
       </p:sp>
@@ -10238,10 +10314,9 @@
           <a:lstStyle/>
           <a:p>
             <a:r>
-              <a:rPr lang="en-US" dirty="0" smtClean="0"/>
+              <a:rPr lang="en-US" dirty="0"/>
               <a:t>Statistical methodology</a:t>
             </a:r>
-            <a:endParaRPr lang="en-US" dirty="0"/>
           </a:p>
         </p:txBody>
       </p:sp>
@@ -10357,13 +10432,6 @@
     <a:masterClrMapping/>
   </p:clrMapOvr>
   <p:transition/>
-  <p:timing>
-    <p:tnLst>
-      <p:par>
-        <p:cTn id="1" dur="indefinite" restart="never" nodeType="tmRoot"/>
-      </p:par>
-    </p:tnLst>
-  </p:timing>
 </p:sld>
 </file>
 
@@ -10405,19 +10473,19 @@
           <a:lstStyle/>
           <a:p>
             <a:r>
-              <a:rPr lang="en-US" dirty="0" smtClean="0"/>
+              <a:rPr lang="en-US" dirty="0"/>
               <a:t>Frameworks(A), </a:t>
             </a:r>
             <a:r>
-              <a:rPr lang="en-US" dirty="0" err="1" smtClean="0"/>
+              <a:rPr lang="en-US" dirty="0" err="1"/>
               <a:t>RGDecomp</a:t>
             </a:r>
             <a:r>
-              <a:rPr lang="en-US" dirty="0" smtClean="0"/>
+              <a:rPr lang="en-US" dirty="0"/>
               <a:t>(B) link to different </a:t>
             </a:r>
             <a:r>
-              <a:rPr lang="en-US" dirty="0" err="1" smtClean="0"/>
+              <a:rPr lang="en-US" dirty="0" err="1"/>
               <a:t>compds</a:t>
             </a:r>
             <a:endParaRPr lang="en-US" dirty="0"/>
@@ -10459,10 +10527,9 @@
           <a:lstStyle/>
           <a:p>
             <a:r>
-              <a:rPr lang="en-US" dirty="0" smtClean="0"/>
+              <a:rPr lang="en-US" dirty="0"/>
               <a:t>Overlap varies from none to total; on average RGD is more efficient </a:t>
             </a:r>
-            <a:endParaRPr lang="en-US" dirty="0"/>
           </a:p>
         </p:txBody>
       </p:sp>
@@ -11003,13 +11070,772 @@
     <a:masterClrMapping/>
   </p:clrMapOvr>
   <p:transition/>
-  <p:timing>
-    <p:tnLst>
-      <p:par>
-        <p:cTn id="1" dur="indefinite" restart="never" nodeType="tmRoot"/>
-      </p:par>
-    </p:tnLst>
-  </p:timing>
+</p:sld>
+</file>
+
+<file path=ppt/slides/slide4.xml><?xml version="1.0" encoding="utf-8"?>
+<p:sld xmlns:a="http://schemas.openxmlformats.org/drawingml/2006/main" xmlns:r="http://schemas.openxmlformats.org/officeDocument/2006/relationships" xmlns:p="http://schemas.openxmlformats.org/presentationml/2006/main">
+  <p:cSld>
+    <p:spTree>
+      <p:nvGrpSpPr>
+        <p:cNvPr id="1" name=""/>
+        <p:cNvGrpSpPr/>
+        <p:nvPr/>
+      </p:nvGrpSpPr>
+      <p:grpSpPr>
+        <a:xfrm>
+          <a:off x="0" y="0"/>
+          <a:ext cx="0" cy="0"/>
+          <a:chOff x="0" y="0"/>
+          <a:chExt cx="0" cy="0"/>
+        </a:xfrm>
+      </p:grpSpPr>
+      <p:pic>
+        <p:nvPicPr>
+          <p:cNvPr id="37" name="Picture 36">
+            <a:extLst>
+              <a:ext uri="{FF2B5EF4-FFF2-40B4-BE49-F238E27FC236}">
+                <a16:creationId xmlns:a16="http://schemas.microsoft.com/office/drawing/2014/main" id="{6D9639A4-8C46-450B-B424-7F95FF6F9CDE}"/>
+              </a:ext>
+            </a:extLst>
+          </p:cNvPr>
+          <p:cNvPicPr>
+            <a:picLocks noChangeAspect="1"/>
+          </p:cNvPicPr>
+          <p:nvPr/>
+        </p:nvPicPr>
+        <p:blipFill rotWithShape="1">
+          <a:blip r:embed="rId3"/>
+          <a:srcRect l="4470" t="4671" r="28013"/>
+          <a:stretch/>
+        </p:blipFill>
+        <p:spPr>
+          <a:xfrm>
+            <a:off x="950713" y="1300920"/>
+            <a:ext cx="6173656" cy="4795909"/>
+          </a:xfrm>
+          <a:prstGeom prst="rect">
+            <a:avLst/>
+          </a:prstGeom>
+        </p:spPr>
+      </p:pic>
+      <p:sp>
+        <p:nvSpPr>
+          <p:cNvPr id="2" name="Title 1"/>
+          <p:cNvSpPr>
+            <a:spLocks noGrp="1"/>
+          </p:cNvSpPr>
+          <p:nvPr>
+            <p:ph type="title"/>
+          </p:nvPr>
+        </p:nvSpPr>
+        <p:spPr>
+          <a:xfrm>
+            <a:off x="365123" y="294810"/>
+            <a:ext cx="7805099" cy="338554"/>
+          </a:xfrm>
+        </p:spPr>
+        <p:txBody>
+          <a:bodyPr/>
+          <a:lstStyle/>
+          <a:p>
+            <a:r>
+              <a:rPr lang="en-US" dirty="0"/>
+              <a:t>Frameworks(A), </a:t>
+            </a:r>
+            <a:r>
+              <a:rPr lang="en-US" dirty="0" err="1"/>
+              <a:t>RGDecomp</a:t>
+            </a:r>
+            <a:r>
+              <a:rPr lang="en-US" dirty="0"/>
+              <a:t>(B) link to different </a:t>
+            </a:r>
+            <a:r>
+              <a:rPr lang="en-US" dirty="0" err="1"/>
+              <a:t>compds</a:t>
+            </a:r>
+            <a:endParaRPr lang="en-US" dirty="0"/>
+          </a:p>
+        </p:txBody>
+      </p:sp>
+      <p:sp>
+        <p:nvSpPr>
+          <p:cNvPr id="5" name="Slide Number Placeholder 4"/>
+          <p:cNvSpPr>
+            <a:spLocks noGrp="1"/>
+          </p:cNvSpPr>
+          <p:nvPr>
+            <p:ph type="sldNum" sz="quarter" idx="17"/>
+          </p:nvPr>
+        </p:nvSpPr>
+        <p:spPr/>
+        <p:txBody>
+          <a:bodyPr/>
+          <a:lstStyle/>
+          <a:p>
+            <a:fld id="{0A838F34-1B32-4019-A24D-EF473E6901BC}" type="slidenum">
+              <a:rPr lang="en-US" smtClean="0">
+                <a:solidFill>
+                  <a:srgbClr val="9A8B7D"/>
+                </a:solidFill>
+              </a:rPr>
+              <a:pPr/>
+              <a:t>4</a:t>
+            </a:fld>
+            <a:endParaRPr lang="en-US">
+              <a:solidFill>
+                <a:srgbClr val="9A8B7D"/>
+              </a:solidFill>
+            </a:endParaRPr>
+          </a:p>
+        </p:txBody>
+      </p:sp>
+      <p:pic>
+        <p:nvPicPr>
+          <p:cNvPr id="174084" name="Picture 4"/>
+          <p:cNvPicPr>
+            <a:picLocks noChangeAspect="1" noChangeArrowheads="1"/>
+          </p:cNvPicPr>
+          <p:nvPr/>
+        </p:nvPicPr>
+        <p:blipFill rotWithShape="1">
+          <a:blip r:embed="rId4" cstate="print"/>
+          <a:srcRect l="18226" t="10722" r="71759" b="63639"/>
+          <a:stretch/>
+        </p:blipFill>
+        <p:spPr bwMode="auto">
+          <a:xfrm>
+            <a:off x="3206795" y="1249205"/>
+            <a:ext cx="925666" cy="1315103"/>
+          </a:xfrm>
+          <a:prstGeom prst="rect">
+            <a:avLst/>
+          </a:prstGeom>
+          <a:noFill/>
+          <a:ln w="9525">
+            <a:solidFill>
+              <a:schemeClr val="tx1"/>
+            </a:solidFill>
+            <a:miter lim="800000"/>
+            <a:headEnd/>
+            <a:tailEnd/>
+          </a:ln>
+        </p:spPr>
+      </p:pic>
+      <p:sp>
+        <p:nvSpPr>
+          <p:cNvPr id="15" name="TextBox 14"/>
+          <p:cNvSpPr txBox="1"/>
+          <p:nvPr/>
+        </p:nvSpPr>
+        <p:spPr>
+          <a:xfrm>
+            <a:off x="6852267" y="3477611"/>
+            <a:ext cx="1940118" cy="1600438"/>
+          </a:xfrm>
+          <a:prstGeom prst="rect">
+            <a:avLst/>
+          </a:prstGeom>
+          <a:noFill/>
+        </p:spPr>
+        <p:txBody>
+          <a:bodyPr wrap="square" rtlCol="0">
+            <a:spAutoFit/>
+          </a:bodyPr>
+          <a:lstStyle/>
+          <a:p>
+            <a:pPr>
+              <a:buClr>
+                <a:srgbClr val="635A54"/>
+              </a:buClr>
+            </a:pPr>
+            <a:r>
+              <a:rPr lang="en-US" sz="1400" b="1" dirty="0">
+                <a:solidFill>
+                  <a:srgbClr val="9900FF"/>
+                </a:solidFill>
+              </a:rPr>
+              <a:t>Fragment Efficiency of </a:t>
+            </a:r>
+            <a:r>
+              <a:rPr lang="en-US" sz="1400" b="1" dirty="0" err="1">
+                <a:solidFill>
+                  <a:srgbClr val="9900FF"/>
+                </a:solidFill>
+              </a:rPr>
+              <a:t>RGDecomp</a:t>
+            </a:r>
+            <a:r>
+              <a:rPr lang="en-US" sz="1400" b="1" dirty="0">
+                <a:solidFill>
+                  <a:srgbClr val="9900FF"/>
+                </a:solidFill>
+              </a:rPr>
+              <a:t> (B) less than  Frameworks (A):</a:t>
+            </a:r>
+          </a:p>
+          <a:p>
+            <a:pPr>
+              <a:buClr>
+                <a:srgbClr val="635A54"/>
+              </a:buClr>
+            </a:pPr>
+            <a:r>
+              <a:rPr lang="en-US" sz="1400" dirty="0">
+                <a:solidFill>
+                  <a:schemeClr val="tx1">
+                    <a:lumMod val="50000"/>
+                  </a:schemeClr>
+                </a:solidFill>
+              </a:rPr>
+              <a:t>Inclusion of fragments attached to benzene ring as Frameworks</a:t>
+            </a:r>
+          </a:p>
+        </p:txBody>
+      </p:sp>
+      <p:sp>
+        <p:nvSpPr>
+          <p:cNvPr id="16" name="TextBox 15"/>
+          <p:cNvSpPr txBox="1"/>
+          <p:nvPr/>
+        </p:nvSpPr>
+        <p:spPr>
+          <a:xfrm>
+            <a:off x="4164710" y="1189373"/>
+            <a:ext cx="2143726" cy="1169551"/>
+          </a:xfrm>
+          <a:prstGeom prst="rect">
+            <a:avLst/>
+          </a:prstGeom>
+          <a:noFill/>
+        </p:spPr>
+        <p:txBody>
+          <a:bodyPr wrap="square" rtlCol="0">
+            <a:spAutoFit/>
+          </a:bodyPr>
+          <a:lstStyle/>
+          <a:p>
+            <a:pPr>
+              <a:buClr>
+                <a:srgbClr val="635A54"/>
+              </a:buClr>
+            </a:pPr>
+            <a:r>
+              <a:rPr lang="en-US" sz="1400" b="1" dirty="0">
+                <a:solidFill>
+                  <a:srgbClr val="E26100"/>
+                </a:solidFill>
+              </a:rPr>
+              <a:t>Fragment Efficiency of </a:t>
+            </a:r>
+            <a:r>
+              <a:rPr lang="en-US" sz="1400" b="1" dirty="0" err="1">
+                <a:solidFill>
+                  <a:srgbClr val="E26100"/>
+                </a:solidFill>
+              </a:rPr>
+              <a:t>RGDecomp</a:t>
+            </a:r>
+            <a:r>
+              <a:rPr lang="en-US" sz="1400" b="1" dirty="0">
+                <a:solidFill>
+                  <a:srgbClr val="E26100"/>
+                </a:solidFill>
+              </a:rPr>
+              <a:t> (B) greater than Frameworks (A):</a:t>
+            </a:r>
+          </a:p>
+          <a:p>
+            <a:pPr>
+              <a:buClr>
+                <a:srgbClr val="635A54"/>
+              </a:buClr>
+            </a:pPr>
+            <a:r>
+              <a:rPr lang="en-US" sz="1400" dirty="0">
+                <a:solidFill>
+                  <a:schemeClr val="tx1">
+                    <a:lumMod val="50000"/>
+                  </a:schemeClr>
+                </a:solidFill>
+              </a:rPr>
+              <a:t>Minor </a:t>
+            </a:r>
+            <a:r>
+              <a:rPr lang="en-US" sz="1400" dirty="0" err="1">
+                <a:solidFill>
+                  <a:schemeClr val="tx1">
+                    <a:lumMod val="50000"/>
+                  </a:schemeClr>
+                </a:solidFill>
+              </a:rPr>
+              <a:t>tautomer</a:t>
+            </a:r>
+            <a:r>
+              <a:rPr lang="en-US" sz="1400" dirty="0">
+                <a:solidFill>
+                  <a:schemeClr val="tx1">
+                    <a:lumMod val="50000"/>
+                  </a:schemeClr>
+                </a:solidFill>
+              </a:rPr>
+              <a:t>, unified by </a:t>
+            </a:r>
+            <a:r>
+              <a:rPr lang="en-US" sz="1400" dirty="0" err="1">
+                <a:solidFill>
+                  <a:schemeClr val="tx1">
+                    <a:lumMod val="50000"/>
+                  </a:schemeClr>
+                </a:solidFill>
+              </a:rPr>
+              <a:t>RGDecomp</a:t>
+            </a:r>
+            <a:endParaRPr lang="en-US" sz="1400" dirty="0">
+              <a:solidFill>
+                <a:schemeClr val="tx1">
+                  <a:lumMod val="50000"/>
+                </a:schemeClr>
+              </a:solidFill>
+            </a:endParaRPr>
+          </a:p>
+        </p:txBody>
+      </p:sp>
+      <p:sp>
+        <p:nvSpPr>
+          <p:cNvPr id="17" name="TextBox 16"/>
+          <p:cNvSpPr txBox="1"/>
+          <p:nvPr/>
+        </p:nvSpPr>
+        <p:spPr>
+          <a:xfrm>
+            <a:off x="19503" y="2806678"/>
+            <a:ext cx="1555674" cy="1738938"/>
+          </a:xfrm>
+          <a:prstGeom prst="rect">
+            <a:avLst/>
+          </a:prstGeom>
+          <a:noFill/>
+        </p:spPr>
+        <p:txBody>
+          <a:bodyPr wrap="square" rtlCol="0">
+            <a:spAutoFit/>
+          </a:bodyPr>
+          <a:lstStyle/>
+          <a:p>
+            <a:pPr marL="171450" indent="-171450">
+              <a:buClr>
+                <a:srgbClr val="635A54"/>
+              </a:buClr>
+            </a:pPr>
+            <a:r>
+              <a:rPr lang="en-US" sz="1400" b="1" dirty="0">
+                <a:solidFill>
+                  <a:srgbClr val="009900"/>
+                </a:solidFill>
+              </a:rPr>
+              <a:t>Similar </a:t>
+            </a:r>
+          </a:p>
+          <a:p>
+            <a:pPr marL="171450" indent="-171450">
+              <a:buClr>
+                <a:srgbClr val="635A54"/>
+              </a:buClr>
+            </a:pPr>
+            <a:r>
+              <a:rPr lang="en-US" sz="1400" b="1" dirty="0">
+                <a:solidFill>
+                  <a:srgbClr val="009900"/>
+                </a:solidFill>
+              </a:rPr>
+              <a:t>efficiency: </a:t>
+            </a:r>
+          </a:p>
+          <a:p>
+            <a:pPr>
+              <a:buClr>
+                <a:srgbClr val="635A54"/>
+              </a:buClr>
+            </a:pPr>
+            <a:br>
+              <a:rPr lang="en-US" sz="700" dirty="0">
+                <a:solidFill>
+                  <a:srgbClr val="635A54">
+                    <a:lumMod val="50000"/>
+                  </a:srgbClr>
+                </a:solidFill>
+              </a:rPr>
+            </a:br>
+            <a:r>
+              <a:rPr lang="en-US" sz="1400" dirty="0">
+                <a:solidFill>
+                  <a:srgbClr val="635A54">
+                    <a:lumMod val="50000"/>
+                  </a:srgbClr>
+                </a:solidFill>
+              </a:rPr>
+              <a:t>almost </a:t>
+            </a:r>
+          </a:p>
+          <a:p>
+            <a:pPr marL="171450" indent="-171450">
+              <a:buClr>
+                <a:srgbClr val="635A54"/>
+              </a:buClr>
+            </a:pPr>
+            <a:r>
+              <a:rPr lang="en-US" sz="1400" dirty="0">
+                <a:solidFill>
+                  <a:srgbClr val="635A54">
+                    <a:lumMod val="50000"/>
+                  </a:srgbClr>
+                </a:solidFill>
+              </a:rPr>
+              <a:t>complete </a:t>
+            </a:r>
+          </a:p>
+          <a:p>
+            <a:pPr marL="171450" indent="-171450">
+              <a:buClr>
+                <a:srgbClr val="635A54"/>
+              </a:buClr>
+            </a:pPr>
+            <a:r>
+              <a:rPr lang="en-US" sz="1400" dirty="0">
+                <a:solidFill>
+                  <a:srgbClr val="635A54">
+                    <a:lumMod val="50000"/>
+                  </a:srgbClr>
+                </a:solidFill>
+              </a:rPr>
+              <a:t>overlap in </a:t>
+            </a:r>
+          </a:p>
+          <a:p>
+            <a:pPr marL="171450" indent="-171450">
+              <a:buClr>
+                <a:srgbClr val="635A54"/>
+              </a:buClr>
+            </a:pPr>
+            <a:r>
+              <a:rPr lang="en-US" sz="1400" dirty="0">
+                <a:solidFill>
+                  <a:srgbClr val="635A54">
+                    <a:lumMod val="50000"/>
+                  </a:srgbClr>
+                </a:solidFill>
+              </a:rPr>
+              <a:t>linked</a:t>
+            </a:r>
+          </a:p>
+          <a:p>
+            <a:pPr marL="171450" indent="-171450">
+              <a:buClr>
+                <a:srgbClr val="635A54"/>
+              </a:buClr>
+            </a:pPr>
+            <a:r>
+              <a:rPr lang="en-US" sz="1400" dirty="0">
+                <a:solidFill>
+                  <a:srgbClr val="635A54">
+                    <a:lumMod val="50000"/>
+                  </a:srgbClr>
+                </a:solidFill>
+              </a:rPr>
+              <a:t>compounds</a:t>
+            </a:r>
+          </a:p>
+        </p:txBody>
+      </p:sp>
+      <p:pic>
+        <p:nvPicPr>
+          <p:cNvPr id="18" name="Picture 4">
+            <a:extLst>
+              <a:ext uri="{FF2B5EF4-FFF2-40B4-BE49-F238E27FC236}">
+                <a16:creationId xmlns:a16="http://schemas.microsoft.com/office/drawing/2014/main" id="{42D349C2-3236-4552-84C4-34157045CE46}"/>
+              </a:ext>
+            </a:extLst>
+          </p:cNvPr>
+          <p:cNvPicPr>
+            <a:picLocks noChangeAspect="1" noChangeArrowheads="1"/>
+          </p:cNvPicPr>
+          <p:nvPr/>
+        </p:nvPicPr>
+        <p:blipFill rotWithShape="1">
+          <a:blip r:embed="rId4" cstate="print"/>
+          <a:srcRect l="18226" t="56657" r="71759" b="17710"/>
+          <a:stretch/>
+        </p:blipFill>
+        <p:spPr bwMode="auto">
+          <a:xfrm>
+            <a:off x="133314" y="4629823"/>
+            <a:ext cx="817399" cy="1350010"/>
+          </a:xfrm>
+          <a:prstGeom prst="rect">
+            <a:avLst/>
+          </a:prstGeom>
+          <a:noFill/>
+          <a:ln w="9525">
+            <a:solidFill>
+              <a:schemeClr val="tx1"/>
+            </a:solidFill>
+            <a:miter lim="800000"/>
+            <a:headEnd/>
+            <a:tailEnd/>
+          </a:ln>
+        </p:spPr>
+      </p:pic>
+      <p:pic>
+        <p:nvPicPr>
+          <p:cNvPr id="19" name="Picture 4">
+            <a:extLst>
+              <a:ext uri="{FF2B5EF4-FFF2-40B4-BE49-F238E27FC236}">
+                <a16:creationId xmlns:a16="http://schemas.microsoft.com/office/drawing/2014/main" id="{6AF02589-4E28-4B71-AF99-FCFC02DABF76}"/>
+              </a:ext>
+            </a:extLst>
+          </p:cNvPr>
+          <p:cNvPicPr>
+            <a:picLocks noChangeAspect="1" noChangeArrowheads="1"/>
+          </p:cNvPicPr>
+          <p:nvPr/>
+        </p:nvPicPr>
+        <p:blipFill rotWithShape="1">
+          <a:blip r:embed="rId4" cstate="print"/>
+          <a:srcRect l="57273" t="59678" r="34152" b="15389"/>
+          <a:stretch/>
+        </p:blipFill>
+        <p:spPr bwMode="auto">
+          <a:xfrm>
+            <a:off x="6176296" y="3522525"/>
+            <a:ext cx="699822" cy="1313122"/>
+          </a:xfrm>
+          <a:prstGeom prst="rect">
+            <a:avLst/>
+          </a:prstGeom>
+          <a:noFill/>
+          <a:ln w="9525">
+            <a:solidFill>
+              <a:schemeClr val="tx1"/>
+            </a:solidFill>
+            <a:miter lim="800000"/>
+            <a:headEnd/>
+            <a:tailEnd/>
+          </a:ln>
+        </p:spPr>
+      </p:pic>
+      <p:cxnSp>
+        <p:nvCxnSpPr>
+          <p:cNvPr id="174081" name="Straight Connector 174080">
+            <a:extLst>
+              <a:ext uri="{FF2B5EF4-FFF2-40B4-BE49-F238E27FC236}">
+                <a16:creationId xmlns:a16="http://schemas.microsoft.com/office/drawing/2014/main" id="{21C181BB-6BFE-4304-98E5-36B39CF330BF}"/>
+              </a:ext>
+            </a:extLst>
+          </p:cNvPr>
+          <p:cNvCxnSpPr>
+            <a:cxnSpLocks/>
+          </p:cNvCxnSpPr>
+          <p:nvPr/>
+        </p:nvCxnSpPr>
+        <p:spPr>
+          <a:xfrm flipV="1">
+            <a:off x="1757238" y="1439186"/>
+            <a:ext cx="1449557" cy="1"/>
+          </a:xfrm>
+          <a:prstGeom prst="line">
+            <a:avLst/>
+          </a:prstGeom>
+          <a:ln>
+            <a:solidFill>
+              <a:schemeClr val="tx1">
+                <a:lumMod val="50000"/>
+              </a:schemeClr>
+            </a:solidFill>
+          </a:ln>
+        </p:spPr>
+        <p:style>
+          <a:lnRef idx="1">
+            <a:schemeClr val="accent1"/>
+          </a:lnRef>
+          <a:fillRef idx="0">
+            <a:schemeClr val="accent1"/>
+          </a:fillRef>
+          <a:effectRef idx="0">
+            <a:schemeClr val="accent1"/>
+          </a:effectRef>
+          <a:fontRef idx="minor">
+            <a:schemeClr val="tx1"/>
+          </a:fontRef>
+        </p:style>
+      </p:cxnSp>
+      <p:pic>
+        <p:nvPicPr>
+          <p:cNvPr id="28" name="Picture 27">
+            <a:extLst>
+              <a:ext uri="{FF2B5EF4-FFF2-40B4-BE49-F238E27FC236}">
+                <a16:creationId xmlns:a16="http://schemas.microsoft.com/office/drawing/2014/main" id="{A031AAC9-CF7E-436B-AA77-2077E00DBB57}"/>
+              </a:ext>
+            </a:extLst>
+          </p:cNvPr>
+          <p:cNvPicPr>
+            <a:picLocks noChangeAspect="1"/>
+          </p:cNvPicPr>
+          <p:nvPr/>
+        </p:nvPicPr>
+        <p:blipFill rotWithShape="1">
+          <a:blip r:embed="rId3"/>
+          <a:srcRect l="74546" t="13529" r="4063" b="45575"/>
+          <a:stretch/>
+        </p:blipFill>
+        <p:spPr>
+          <a:xfrm>
+            <a:off x="6518257" y="1234583"/>
+            <a:ext cx="2067388" cy="2174563"/>
+          </a:xfrm>
+          <a:prstGeom prst="rect">
+            <a:avLst/>
+          </a:prstGeom>
+          <a:ln>
+            <a:solidFill>
+              <a:schemeClr val="tx1"/>
+            </a:solidFill>
+          </a:ln>
+        </p:spPr>
+      </p:pic>
+      <p:pic>
+        <p:nvPicPr>
+          <p:cNvPr id="41" name="Picture 40">
+            <a:extLst>
+              <a:ext uri="{FF2B5EF4-FFF2-40B4-BE49-F238E27FC236}">
+                <a16:creationId xmlns:a16="http://schemas.microsoft.com/office/drawing/2014/main" id="{268AAA76-884A-4E25-B277-C0EEACC4AAA7}"/>
+              </a:ext>
+            </a:extLst>
+          </p:cNvPr>
+          <p:cNvPicPr>
+            <a:picLocks noChangeAspect="1"/>
+          </p:cNvPicPr>
+          <p:nvPr/>
+        </p:nvPicPr>
+        <p:blipFill rotWithShape="1">
+          <a:blip r:embed="rId3"/>
+          <a:srcRect l="-376" t="45325" r="97854" b="47342"/>
+          <a:stretch/>
+        </p:blipFill>
+        <p:spPr>
+          <a:xfrm>
+            <a:off x="670493" y="2186095"/>
+            <a:ext cx="230589" cy="368941"/>
+          </a:xfrm>
+          <a:prstGeom prst="rect">
+            <a:avLst/>
+          </a:prstGeom>
+        </p:spPr>
+      </p:pic>
+      <p:cxnSp>
+        <p:nvCxnSpPr>
+          <p:cNvPr id="42" name="Straight Connector 41">
+            <a:extLst>
+              <a:ext uri="{FF2B5EF4-FFF2-40B4-BE49-F238E27FC236}">
+                <a16:creationId xmlns:a16="http://schemas.microsoft.com/office/drawing/2014/main" id="{4AB7C522-5718-4E5B-B0B6-0F575E7B572B}"/>
+              </a:ext>
+            </a:extLst>
+          </p:cNvPr>
+          <p:cNvCxnSpPr>
+            <a:cxnSpLocks/>
+            <a:stCxn id="18" idx="3"/>
+          </p:cNvCxnSpPr>
+          <p:nvPr/>
+        </p:nvCxnSpPr>
+        <p:spPr>
+          <a:xfrm>
+            <a:off x="950713" y="5304828"/>
+            <a:ext cx="571263" cy="0"/>
+          </a:xfrm>
+          <a:prstGeom prst="line">
+            <a:avLst/>
+          </a:prstGeom>
+          <a:ln>
+            <a:solidFill>
+              <a:schemeClr val="tx1">
+                <a:lumMod val="50000"/>
+              </a:schemeClr>
+            </a:solidFill>
+          </a:ln>
+        </p:spPr>
+        <p:style>
+          <a:lnRef idx="1">
+            <a:schemeClr val="accent1"/>
+          </a:lnRef>
+          <a:fillRef idx="0">
+            <a:schemeClr val="accent1"/>
+          </a:fillRef>
+          <a:effectRef idx="0">
+            <a:schemeClr val="accent1"/>
+          </a:effectRef>
+          <a:fontRef idx="minor">
+            <a:schemeClr val="tx1"/>
+          </a:fontRef>
+        </p:style>
+      </p:cxnSp>
+      <p:cxnSp>
+        <p:nvCxnSpPr>
+          <p:cNvPr id="51" name="Straight Connector 50">
+            <a:extLst>
+              <a:ext uri="{FF2B5EF4-FFF2-40B4-BE49-F238E27FC236}">
+                <a16:creationId xmlns:a16="http://schemas.microsoft.com/office/drawing/2014/main" id="{289D2DB0-E3D0-4761-AE8A-0E92CD1C25D0}"/>
+              </a:ext>
+            </a:extLst>
+          </p:cNvPr>
+          <p:cNvCxnSpPr>
+            <a:cxnSpLocks/>
+            <a:stCxn id="19" idx="2"/>
+          </p:cNvCxnSpPr>
+          <p:nvPr/>
+        </p:nvCxnSpPr>
+        <p:spPr>
+          <a:xfrm>
+            <a:off x="6526207" y="4835647"/>
+            <a:ext cx="494795" cy="548558"/>
+          </a:xfrm>
+          <a:prstGeom prst="line">
+            <a:avLst/>
+          </a:prstGeom>
+          <a:ln>
+            <a:solidFill>
+              <a:schemeClr val="tx1">
+                <a:lumMod val="50000"/>
+              </a:schemeClr>
+            </a:solidFill>
+          </a:ln>
+        </p:spPr>
+        <p:style>
+          <a:lnRef idx="1">
+            <a:schemeClr val="accent1"/>
+          </a:lnRef>
+          <a:fillRef idx="0">
+            <a:schemeClr val="accent1"/>
+          </a:fillRef>
+          <a:effectRef idx="0">
+            <a:schemeClr val="accent1"/>
+          </a:effectRef>
+          <a:fontRef idx="minor">
+            <a:schemeClr val="tx1"/>
+          </a:fontRef>
+        </p:style>
+      </p:cxnSp>
+    </p:spTree>
+    <p:extLst>
+      <p:ext uri="{BB962C8B-B14F-4D97-AF65-F5344CB8AC3E}">
+        <p14:creationId xmlns:p14="http://schemas.microsoft.com/office/powerpoint/2010/main" val="819711690"/>
+      </p:ext>
+    </p:extLst>
+  </p:cSld>
+  <p:clrMapOvr>
+    <a:masterClrMapping/>
+  </p:clrMapOvr>
+  <p:transition/>
 </p:sld>
 </file>
 

</xml_diff>